<commit_message>
adjust slides for readme
</commit_message>
<xml_diff>
--- a/github_workshop.pptx
+++ b/github_workshop.pptx
@@ -13,7 +13,8 @@
     <p:sldId id="261" r:id="rId7"/>
     <p:sldId id="262" r:id="rId8"/>
     <p:sldId id="256" r:id="rId9"/>
-    <p:sldId id="263" r:id="rId10"/>
+    <p:sldId id="265" r:id="rId10"/>
+    <p:sldId id="263" r:id="rId11"/>
   </p:sldIdLst>
   <p:sldSz cx="12192000" cy="6858000"/>
   <p:notesSz cx="6858000" cy="9144000"/>
@@ -267,7 +268,7 @@
           <a:p>
             <a:fld id="{B20B002A-08C6-4477-89A6-2518FA80013A}" type="datetimeFigureOut">
               <a:rPr lang="de-DE" smtClean="0"/>
-              <a:t>19.07.2022</a:t>
+              <a:t>20.07.2022</a:t>
             </a:fld>
             <a:endParaRPr lang="de-DE"/>
           </a:p>
@@ -465,7 +466,7 @@
           <a:p>
             <a:fld id="{B20B002A-08C6-4477-89A6-2518FA80013A}" type="datetimeFigureOut">
               <a:rPr lang="de-DE" smtClean="0"/>
-              <a:t>19.07.2022</a:t>
+              <a:t>20.07.2022</a:t>
             </a:fld>
             <a:endParaRPr lang="de-DE"/>
           </a:p>
@@ -673,7 +674,7 @@
           <a:p>
             <a:fld id="{B20B002A-08C6-4477-89A6-2518FA80013A}" type="datetimeFigureOut">
               <a:rPr lang="de-DE" smtClean="0"/>
-              <a:t>19.07.2022</a:t>
+              <a:t>20.07.2022</a:t>
             </a:fld>
             <a:endParaRPr lang="de-DE"/>
           </a:p>
@@ -871,7 +872,7 @@
           <a:p>
             <a:fld id="{B20B002A-08C6-4477-89A6-2518FA80013A}" type="datetimeFigureOut">
               <a:rPr lang="de-DE" smtClean="0"/>
-              <a:t>19.07.2022</a:t>
+              <a:t>20.07.2022</a:t>
             </a:fld>
             <a:endParaRPr lang="de-DE"/>
           </a:p>
@@ -1146,7 +1147,7 @@
           <a:p>
             <a:fld id="{B20B002A-08C6-4477-89A6-2518FA80013A}" type="datetimeFigureOut">
               <a:rPr lang="de-DE" smtClean="0"/>
-              <a:t>19.07.2022</a:t>
+              <a:t>20.07.2022</a:t>
             </a:fld>
             <a:endParaRPr lang="de-DE"/>
           </a:p>
@@ -1411,7 +1412,7 @@
           <a:p>
             <a:fld id="{B20B002A-08C6-4477-89A6-2518FA80013A}" type="datetimeFigureOut">
               <a:rPr lang="de-DE" smtClean="0"/>
-              <a:t>19.07.2022</a:t>
+              <a:t>20.07.2022</a:t>
             </a:fld>
             <a:endParaRPr lang="de-DE"/>
           </a:p>
@@ -1823,7 +1824,7 @@
           <a:p>
             <a:fld id="{B20B002A-08C6-4477-89A6-2518FA80013A}" type="datetimeFigureOut">
               <a:rPr lang="de-DE" smtClean="0"/>
-              <a:t>19.07.2022</a:t>
+              <a:t>20.07.2022</a:t>
             </a:fld>
             <a:endParaRPr lang="de-DE"/>
           </a:p>
@@ -1964,7 +1965,7 @@
           <a:p>
             <a:fld id="{B20B002A-08C6-4477-89A6-2518FA80013A}" type="datetimeFigureOut">
               <a:rPr lang="de-DE" smtClean="0"/>
-              <a:t>19.07.2022</a:t>
+              <a:t>20.07.2022</a:t>
             </a:fld>
             <a:endParaRPr lang="de-DE"/>
           </a:p>
@@ -2077,7 +2078,7 @@
           <a:p>
             <a:fld id="{B20B002A-08C6-4477-89A6-2518FA80013A}" type="datetimeFigureOut">
               <a:rPr lang="de-DE" smtClean="0"/>
-              <a:t>19.07.2022</a:t>
+              <a:t>20.07.2022</a:t>
             </a:fld>
             <a:endParaRPr lang="de-DE"/>
           </a:p>
@@ -2388,7 +2389,7 @@
           <a:p>
             <a:fld id="{B20B002A-08C6-4477-89A6-2518FA80013A}" type="datetimeFigureOut">
               <a:rPr lang="de-DE" smtClean="0"/>
-              <a:t>19.07.2022</a:t>
+              <a:t>20.07.2022</a:t>
             </a:fld>
             <a:endParaRPr lang="de-DE"/>
           </a:p>
@@ -2676,7 +2677,7 @@
           <a:p>
             <a:fld id="{B20B002A-08C6-4477-89A6-2518FA80013A}" type="datetimeFigureOut">
               <a:rPr lang="de-DE" smtClean="0"/>
-              <a:t>19.07.2022</a:t>
+              <a:t>20.07.2022</a:t>
             </a:fld>
             <a:endParaRPr lang="de-DE"/>
           </a:p>
@@ -2917,7 +2918,7 @@
           <a:p>
             <a:fld id="{B20B002A-08C6-4477-89A6-2518FA80013A}" type="datetimeFigureOut">
               <a:rPr lang="de-DE" smtClean="0"/>
-              <a:t>19.07.2022</a:t>
+              <a:t>20.07.2022</a:t>
             </a:fld>
             <a:endParaRPr lang="de-DE"/>
           </a:p>
@@ -3424,6 +3425,131 @@
     <p:extLst>
       <p:ext uri="{BB962C8B-B14F-4D97-AF65-F5344CB8AC3E}">
         <p14:creationId xmlns:p14="http://schemas.microsoft.com/office/powerpoint/2010/main" val="1806494675"/>
+      </p:ext>
+    </p:extLst>
+  </p:cSld>
+  <p:clrMapOvr>
+    <a:masterClrMapping/>
+  </p:clrMapOvr>
+</p:sld>
+</file>
+
+<file path=ppt/slides/slide10.xml><?xml version="1.0" encoding="utf-8"?>
+<p:sld xmlns:a="http://schemas.openxmlformats.org/drawingml/2006/main" xmlns:r="http://schemas.openxmlformats.org/officeDocument/2006/relationships" xmlns:p="http://schemas.openxmlformats.org/presentationml/2006/main">
+  <p:cSld>
+    <p:spTree>
+      <p:nvGrpSpPr>
+        <p:cNvPr id="1" name=""/>
+        <p:cNvGrpSpPr/>
+        <p:nvPr/>
+      </p:nvGrpSpPr>
+      <p:grpSpPr>
+        <a:xfrm>
+          <a:off x="0" y="0"/>
+          <a:ext cx="0" cy="0"/>
+          <a:chOff x="0" y="0"/>
+          <a:chExt cx="0" cy="0"/>
+        </a:xfrm>
+      </p:grpSpPr>
+      <p:sp>
+        <p:nvSpPr>
+          <p:cNvPr id="2" name="Titel 1">
+            <a:extLst>
+              <a:ext uri="{FF2B5EF4-FFF2-40B4-BE49-F238E27FC236}">
+                <a16:creationId xmlns:a16="http://schemas.microsoft.com/office/drawing/2014/main" id="{E22E3B27-615A-4221-BFE7-450D563FEC17}"/>
+              </a:ext>
+            </a:extLst>
+          </p:cNvPr>
+          <p:cNvSpPr>
+            <a:spLocks noGrp="1"/>
+          </p:cNvSpPr>
+          <p:nvPr>
+            <p:ph type="title"/>
+          </p:nvPr>
+        </p:nvSpPr>
+        <p:spPr/>
+        <p:txBody>
+          <a:bodyPr/>
+          <a:lstStyle/>
+          <a:p>
+            <a:pPr algn="ctr"/>
+            <a:r>
+              <a:rPr lang="de-DE" dirty="0"/>
+              <a:t>Hands on</a:t>
+            </a:r>
+          </a:p>
+        </p:txBody>
+      </p:sp>
+      <p:pic>
+        <p:nvPicPr>
+          <p:cNvPr id="6" name="Grafik 5">
+            <a:extLst>
+              <a:ext uri="{FF2B5EF4-FFF2-40B4-BE49-F238E27FC236}">
+                <a16:creationId xmlns:a16="http://schemas.microsoft.com/office/drawing/2014/main" id="{B28AA8C1-22F6-4F07-B138-419B79429575}"/>
+              </a:ext>
+            </a:extLst>
+          </p:cNvPr>
+          <p:cNvPicPr>
+            <a:picLocks noChangeAspect="1"/>
+          </p:cNvPicPr>
+          <p:nvPr/>
+        </p:nvPicPr>
+        <p:blipFill>
+          <a:blip r:embed="rId2"/>
+          <a:stretch>
+            <a:fillRect/>
+          </a:stretch>
+        </p:blipFill>
+        <p:spPr>
+          <a:xfrm>
+            <a:off x="2224085" y="4476023"/>
+            <a:ext cx="7743825" cy="1819275"/>
+          </a:xfrm>
+          <a:prstGeom prst="rect">
+            <a:avLst/>
+          </a:prstGeom>
+        </p:spPr>
+      </p:pic>
+      <p:pic>
+        <p:nvPicPr>
+          <p:cNvPr id="4" name="Grafik 3">
+            <a:extLst>
+              <a:ext uri="{FF2B5EF4-FFF2-40B4-BE49-F238E27FC236}">
+                <a16:creationId xmlns:a16="http://schemas.microsoft.com/office/drawing/2014/main" id="{AD20252C-FB57-465A-ADDB-7E905D832B29}"/>
+              </a:ext>
+            </a:extLst>
+          </p:cNvPr>
+          <p:cNvPicPr>
+            <a:picLocks noChangeAspect="1"/>
+          </p:cNvPicPr>
+          <p:nvPr/>
+        </p:nvPicPr>
+        <p:blipFill>
+          <a:blip r:embed="rId3">
+            <a:extLst>
+              <a:ext uri="{28A0092B-C50C-407E-A947-70E740481C1C}">
+                <a14:useLocalDpi xmlns:a14="http://schemas.microsoft.com/office/drawing/2010/main" val="0"/>
+              </a:ext>
+            </a:extLst>
+          </a:blip>
+          <a:stretch>
+            <a:fillRect/>
+          </a:stretch>
+        </p:blipFill>
+        <p:spPr>
+          <a:xfrm>
+            <a:off x="5024434" y="1797803"/>
+            <a:ext cx="2143125" cy="2143125"/>
+          </a:xfrm>
+          <a:prstGeom prst="rect">
+            <a:avLst/>
+          </a:prstGeom>
+        </p:spPr>
+      </p:pic>
+    </p:spTree>
+    <p:extLst>
+      <p:ext uri="{BB962C8B-B14F-4D97-AF65-F5344CB8AC3E}">
+        <p14:creationId xmlns:p14="http://schemas.microsoft.com/office/powerpoint/2010/main" val="2502894247"/>
       </p:ext>
     </p:extLst>
   </p:cSld>
@@ -10041,8 +10167,8 @@
         </p:nvSpPr>
         <p:spPr>
           <a:xfrm>
-            <a:off x="1890793" y="1690688"/>
-            <a:ext cx="8276094" cy="4314907"/>
+            <a:off x="4390845" y="1690688"/>
+            <a:ext cx="3338423" cy="4314907"/>
           </a:xfrm>
           <a:prstGeom prst="rect">
             <a:avLst/>
@@ -13933,6 +14059,306 @@
           </a:prstGeom>
         </p:spPr>
       </p:pic>
+      <p:cxnSp>
+        <p:nvCxnSpPr>
+          <p:cNvPr id="84" name="Gerade Verbindung mit Pfeil 83">
+            <a:extLst>
+              <a:ext uri="{FF2B5EF4-FFF2-40B4-BE49-F238E27FC236}">
+                <a16:creationId xmlns:a16="http://schemas.microsoft.com/office/drawing/2014/main" id="{4AE2711A-69DC-4D84-9AC6-DE80235B1FBB}"/>
+              </a:ext>
+            </a:extLst>
+          </p:cNvPr>
+          <p:cNvCxnSpPr>
+            <a:cxnSpLocks/>
+          </p:cNvCxnSpPr>
+          <p:nvPr/>
+        </p:nvCxnSpPr>
+        <p:spPr>
+          <a:xfrm flipV="1">
+            <a:off x="10410434" y="5138532"/>
+            <a:ext cx="0" cy="230145"/>
+          </a:xfrm>
+          <a:prstGeom prst="straightConnector1">
+            <a:avLst/>
+          </a:prstGeom>
+          <a:ln>
+            <a:tailEnd type="triangle"/>
+          </a:ln>
+        </p:spPr>
+        <p:style>
+          <a:lnRef idx="3">
+            <a:schemeClr val="dk1"/>
+          </a:lnRef>
+          <a:fillRef idx="0">
+            <a:schemeClr val="dk1"/>
+          </a:fillRef>
+          <a:effectRef idx="2">
+            <a:schemeClr val="dk1"/>
+          </a:effectRef>
+          <a:fontRef idx="minor">
+            <a:schemeClr val="tx1"/>
+          </a:fontRef>
+        </p:style>
+      </p:cxnSp>
+      <p:sp>
+        <p:nvSpPr>
+          <p:cNvPr id="88" name="Textfeld 87">
+            <a:extLst>
+              <a:ext uri="{FF2B5EF4-FFF2-40B4-BE49-F238E27FC236}">
+                <a16:creationId xmlns:a16="http://schemas.microsoft.com/office/drawing/2014/main" id="{92933BCB-2C22-FA87-A19E-C4680A5773A6}"/>
+              </a:ext>
+            </a:extLst>
+          </p:cNvPr>
+          <p:cNvSpPr txBox="1"/>
+          <p:nvPr/>
+        </p:nvSpPr>
+        <p:spPr>
+          <a:xfrm>
+            <a:off x="9787988" y="5354075"/>
+            <a:ext cx="1235275" cy="307777"/>
+          </a:xfrm>
+          <a:prstGeom prst="rect">
+            <a:avLst/>
+          </a:prstGeom>
+          <a:noFill/>
+        </p:spPr>
+        <p:txBody>
+          <a:bodyPr wrap="none" rtlCol="0">
+            <a:spAutoFit/>
+          </a:bodyPr>
+          <a:lstStyle/>
+          <a:p>
+            <a:r>
+              <a:rPr lang="de-DE" sz="1400" b="1" dirty="0" err="1"/>
+              <a:t>master</a:t>
+            </a:r>
+            <a:r>
+              <a:rPr lang="de-DE" sz="1400" b="1" dirty="0"/>
+              <a:t> / </a:t>
+            </a:r>
+            <a:r>
+              <a:rPr lang="de-DE" sz="1400" b="1" dirty="0" err="1"/>
+              <a:t>main</a:t>
+            </a:r>
+            <a:endParaRPr lang="de-DE" sz="1400" b="1" dirty="0"/>
+          </a:p>
+        </p:txBody>
+      </p:sp>
+      <p:cxnSp>
+        <p:nvCxnSpPr>
+          <p:cNvPr id="89" name="Gerade Verbindung mit Pfeil 88">
+            <a:extLst>
+              <a:ext uri="{FF2B5EF4-FFF2-40B4-BE49-F238E27FC236}">
+                <a16:creationId xmlns:a16="http://schemas.microsoft.com/office/drawing/2014/main" id="{604FBDB7-BE99-E343-68D1-E9963D8C6240}"/>
+              </a:ext>
+            </a:extLst>
+          </p:cNvPr>
+          <p:cNvCxnSpPr>
+            <a:cxnSpLocks/>
+          </p:cNvCxnSpPr>
+          <p:nvPr/>
+        </p:nvCxnSpPr>
+        <p:spPr>
+          <a:xfrm flipV="1">
+            <a:off x="10413733" y="4862144"/>
+            <a:ext cx="0" cy="230145"/>
+          </a:xfrm>
+          <a:prstGeom prst="straightConnector1">
+            <a:avLst/>
+          </a:prstGeom>
+          <a:ln>
+            <a:tailEnd type="triangle"/>
+          </a:ln>
+        </p:spPr>
+        <p:style>
+          <a:lnRef idx="3">
+            <a:schemeClr val="dk1"/>
+          </a:lnRef>
+          <a:fillRef idx="0">
+            <a:schemeClr val="dk1"/>
+          </a:fillRef>
+          <a:effectRef idx="2">
+            <a:schemeClr val="dk1"/>
+          </a:effectRef>
+          <a:fontRef idx="minor">
+            <a:schemeClr val="tx1"/>
+          </a:fontRef>
+        </p:style>
+      </p:cxnSp>
+      <p:cxnSp>
+        <p:nvCxnSpPr>
+          <p:cNvPr id="91" name="Gerade Verbindung mit Pfeil 90">
+            <a:extLst>
+              <a:ext uri="{FF2B5EF4-FFF2-40B4-BE49-F238E27FC236}">
+                <a16:creationId xmlns:a16="http://schemas.microsoft.com/office/drawing/2014/main" id="{9EDA331E-968E-3E62-E24C-A7BC8099FF56}"/>
+              </a:ext>
+            </a:extLst>
+          </p:cNvPr>
+          <p:cNvCxnSpPr>
+            <a:cxnSpLocks/>
+          </p:cNvCxnSpPr>
+          <p:nvPr/>
+        </p:nvCxnSpPr>
+        <p:spPr>
+          <a:xfrm flipV="1">
+            <a:off x="10402237" y="4608752"/>
+            <a:ext cx="0" cy="230145"/>
+          </a:xfrm>
+          <a:prstGeom prst="straightConnector1">
+            <a:avLst/>
+          </a:prstGeom>
+          <a:ln>
+            <a:solidFill>
+              <a:schemeClr val="bg1">
+                <a:lumMod val="65000"/>
+              </a:schemeClr>
+            </a:solidFill>
+            <a:tailEnd type="triangle"/>
+          </a:ln>
+        </p:spPr>
+        <p:style>
+          <a:lnRef idx="3">
+            <a:schemeClr val="dk1"/>
+          </a:lnRef>
+          <a:fillRef idx="0">
+            <a:schemeClr val="dk1"/>
+          </a:fillRef>
+          <a:effectRef idx="2">
+            <a:schemeClr val="dk1"/>
+          </a:effectRef>
+          <a:fontRef idx="minor">
+            <a:schemeClr val="tx1"/>
+          </a:fontRef>
+        </p:style>
+      </p:cxnSp>
+      <p:cxnSp>
+        <p:nvCxnSpPr>
+          <p:cNvPr id="92" name="Gerade Verbindung mit Pfeil 91">
+            <a:extLst>
+              <a:ext uri="{FF2B5EF4-FFF2-40B4-BE49-F238E27FC236}">
+                <a16:creationId xmlns:a16="http://schemas.microsoft.com/office/drawing/2014/main" id="{2AD096AF-778E-1072-CD49-60F741E8B95E}"/>
+              </a:ext>
+            </a:extLst>
+          </p:cNvPr>
+          <p:cNvCxnSpPr>
+            <a:cxnSpLocks/>
+          </p:cNvCxnSpPr>
+          <p:nvPr/>
+        </p:nvCxnSpPr>
+        <p:spPr>
+          <a:xfrm flipV="1">
+            <a:off x="10401878" y="4355360"/>
+            <a:ext cx="0" cy="230145"/>
+          </a:xfrm>
+          <a:prstGeom prst="straightConnector1">
+            <a:avLst/>
+          </a:prstGeom>
+          <a:ln>
+            <a:solidFill>
+              <a:schemeClr val="bg1">
+                <a:lumMod val="65000"/>
+              </a:schemeClr>
+            </a:solidFill>
+            <a:tailEnd type="triangle"/>
+          </a:ln>
+        </p:spPr>
+        <p:style>
+          <a:lnRef idx="3">
+            <a:schemeClr val="dk1"/>
+          </a:lnRef>
+          <a:fillRef idx="0">
+            <a:schemeClr val="dk1"/>
+          </a:fillRef>
+          <a:effectRef idx="2">
+            <a:schemeClr val="dk1"/>
+          </a:effectRef>
+          <a:fontRef idx="minor">
+            <a:schemeClr val="tx1"/>
+          </a:fontRef>
+        </p:style>
+      </p:cxnSp>
+      <p:cxnSp>
+        <p:nvCxnSpPr>
+          <p:cNvPr id="93" name="Gerade Verbindung mit Pfeil 92">
+            <a:extLst>
+              <a:ext uri="{FF2B5EF4-FFF2-40B4-BE49-F238E27FC236}">
+                <a16:creationId xmlns:a16="http://schemas.microsoft.com/office/drawing/2014/main" id="{15C691FE-FA5E-D129-E9F5-D4EA7C3CF195}"/>
+              </a:ext>
+            </a:extLst>
+          </p:cNvPr>
+          <p:cNvCxnSpPr>
+            <a:cxnSpLocks/>
+          </p:cNvCxnSpPr>
+          <p:nvPr/>
+        </p:nvCxnSpPr>
+        <p:spPr>
+          <a:xfrm flipV="1">
+            <a:off x="10401878" y="3915510"/>
+            <a:ext cx="0" cy="230145"/>
+          </a:xfrm>
+          <a:prstGeom prst="straightConnector1">
+            <a:avLst/>
+          </a:prstGeom>
+          <a:ln>
+            <a:tailEnd type="triangle"/>
+          </a:ln>
+        </p:spPr>
+        <p:style>
+          <a:lnRef idx="3">
+            <a:schemeClr val="dk1"/>
+          </a:lnRef>
+          <a:fillRef idx="0">
+            <a:schemeClr val="dk1"/>
+          </a:fillRef>
+          <a:effectRef idx="2">
+            <a:schemeClr val="dk1"/>
+          </a:effectRef>
+          <a:fontRef idx="minor">
+            <a:schemeClr val="tx1"/>
+          </a:fontRef>
+        </p:style>
+      </p:cxnSp>
+      <p:cxnSp>
+        <p:nvCxnSpPr>
+          <p:cNvPr id="94" name="Gerade Verbindung mit Pfeil 93">
+            <a:extLst>
+              <a:ext uri="{FF2B5EF4-FFF2-40B4-BE49-F238E27FC236}">
+                <a16:creationId xmlns:a16="http://schemas.microsoft.com/office/drawing/2014/main" id="{E9335AEB-2659-A4F2-7C33-BEF40B9295A9}"/>
+              </a:ext>
+            </a:extLst>
+          </p:cNvPr>
+          <p:cNvCxnSpPr>
+            <a:cxnSpLocks/>
+          </p:cNvCxnSpPr>
+          <p:nvPr/>
+        </p:nvCxnSpPr>
+        <p:spPr>
+          <a:xfrm flipV="1">
+            <a:off x="10401878" y="3631943"/>
+            <a:ext cx="0" cy="230145"/>
+          </a:xfrm>
+          <a:prstGeom prst="straightConnector1">
+            <a:avLst/>
+          </a:prstGeom>
+          <a:ln>
+            <a:tailEnd type="triangle"/>
+          </a:ln>
+        </p:spPr>
+        <p:style>
+          <a:lnRef idx="3">
+            <a:schemeClr val="dk1"/>
+          </a:lnRef>
+          <a:fillRef idx="0">
+            <a:schemeClr val="dk1"/>
+          </a:fillRef>
+          <a:effectRef idx="2">
+            <a:schemeClr val="dk1"/>
+          </a:effectRef>
+          <a:fontRef idx="minor">
+            <a:schemeClr val="tx1"/>
+          </a:fontRef>
+        </p:style>
+      </p:cxnSp>
     </p:spTree>
     <p:extLst>
       <p:ext uri="{BB962C8B-B14F-4D97-AF65-F5344CB8AC3E}">
@@ -15157,6 +15583,150 @@
                       </p:childTnLst>
                     </p:cTn>
                   </p:par>
+                  <p:par>
+                    <p:cTn id="101" fill="hold">
+                      <p:stCondLst>
+                        <p:cond delay="indefinite"/>
+                      </p:stCondLst>
+                      <p:childTnLst>
+                        <p:par>
+                          <p:cTn id="102" fill="hold">
+                            <p:stCondLst>
+                              <p:cond delay="0"/>
+                            </p:stCondLst>
+                            <p:childTnLst>
+                              <p:par>
+                                <p:cTn id="103" presetID="1" presetClass="entr" presetSubtype="0" fill="hold" nodeType="clickEffect">
+                                  <p:stCondLst>
+                                    <p:cond delay="0"/>
+                                  </p:stCondLst>
+                                  <p:childTnLst>
+                                    <p:set>
+                                      <p:cBhvr>
+                                        <p:cTn id="104" dur="1" fill="hold">
+                                          <p:stCondLst>
+                                            <p:cond delay="0"/>
+                                          </p:stCondLst>
+                                        </p:cTn>
+                                        <p:tgtEl>
+                                          <p:spTgt spid="92"/>
+                                        </p:tgtEl>
+                                        <p:attrNameLst>
+                                          <p:attrName>style.visibility</p:attrName>
+                                        </p:attrNameLst>
+                                      </p:cBhvr>
+                                      <p:to>
+                                        <p:strVal val="visible"/>
+                                      </p:to>
+                                    </p:set>
+                                  </p:childTnLst>
+                                </p:cTn>
+                              </p:par>
+                              <p:par>
+                                <p:cTn id="105" presetID="1" presetClass="entr" presetSubtype="0" fill="hold" nodeType="withEffect">
+                                  <p:stCondLst>
+                                    <p:cond delay="0"/>
+                                  </p:stCondLst>
+                                  <p:childTnLst>
+                                    <p:set>
+                                      <p:cBhvr>
+                                        <p:cTn id="106" dur="1" fill="hold">
+                                          <p:stCondLst>
+                                            <p:cond delay="0"/>
+                                          </p:stCondLst>
+                                        </p:cTn>
+                                        <p:tgtEl>
+                                          <p:spTgt spid="91"/>
+                                        </p:tgtEl>
+                                        <p:attrNameLst>
+                                          <p:attrName>style.visibility</p:attrName>
+                                        </p:attrNameLst>
+                                      </p:cBhvr>
+                                      <p:to>
+                                        <p:strVal val="visible"/>
+                                      </p:to>
+                                    </p:set>
+                                  </p:childTnLst>
+                                </p:cTn>
+                              </p:par>
+                            </p:childTnLst>
+                          </p:cTn>
+                        </p:par>
+                      </p:childTnLst>
+                    </p:cTn>
+                  </p:par>
+                  <p:par>
+                    <p:cTn id="107" fill="hold">
+                      <p:stCondLst>
+                        <p:cond delay="indefinite"/>
+                      </p:stCondLst>
+                      <p:childTnLst>
+                        <p:par>
+                          <p:cTn id="108" fill="hold">
+                            <p:stCondLst>
+                              <p:cond delay="0"/>
+                            </p:stCondLst>
+                            <p:childTnLst>
+                              <p:par>
+                                <p:cTn id="109" presetID="1" presetClass="entr" presetSubtype="0" fill="hold" nodeType="clickEffect">
+                                  <p:stCondLst>
+                                    <p:cond delay="0"/>
+                                  </p:stCondLst>
+                                  <p:childTnLst>
+                                    <p:set>
+                                      <p:cBhvr>
+                                        <p:cTn id="110" dur="1" fill="hold">
+                                          <p:stCondLst>
+                                            <p:cond delay="0"/>
+                                          </p:stCondLst>
+                                        </p:cTn>
+                                        <p:tgtEl>
+                                          <p:spTgt spid="93"/>
+                                        </p:tgtEl>
+                                        <p:attrNameLst>
+                                          <p:attrName>style.visibility</p:attrName>
+                                        </p:attrNameLst>
+                                      </p:cBhvr>
+                                      <p:to>
+                                        <p:strVal val="visible"/>
+                                      </p:to>
+                                    </p:set>
+                                  </p:childTnLst>
+                                </p:cTn>
+                              </p:par>
+                              <p:par>
+                                <p:cTn id="111" presetID="1" presetClass="entr" presetSubtype="0" fill="hold" nodeType="withEffect">
+                                  <p:stCondLst>
+                                    <p:cond delay="0"/>
+                                  </p:stCondLst>
+                                  <p:childTnLst>
+                                    <p:set>
+                                      <p:cBhvr>
+                                        <p:cTn id="112" dur="1" fill="hold">
+                                          <p:stCondLst>
+                                            <p:cond delay="0"/>
+                                          </p:stCondLst>
+                                        </p:cTn>
+                                        <p:tgtEl>
+                                          <p:spTgt spid="94"/>
+                                        </p:tgtEl>
+                                        <p:attrNameLst>
+                                          <p:attrName>style.visibility</p:attrName>
+                                        </p:attrNameLst>
+                                      </p:cBhvr>
+                                      <p:to>
+                                        <p:strVal val="visible"/>
+                                      </p:to>
+                                    </p:set>
+                                  </p:childTnLst>
+                                </p:cTn>
+                              </p:par>
+                            </p:childTnLst>
+                          </p:cTn>
+                        </p:par>
+                      </p:childTnLst>
+                    </p:cTn>
+                  </p:par>
                 </p:childTnLst>
               </p:cTn>
               <p:prevCondLst>
@@ -20988,12 +21558,8 @@
           <a:p>
             <a:pPr algn="ctr"/>
             <a:r>
-              <a:rPr lang="de-DE" sz="1400" b="1" dirty="0" err="1"/>
-              <a:t>ecesnaite</a:t>
-            </a:r>
-            <a:r>
               <a:rPr lang="de-DE" sz="1400" b="1" dirty="0"/>
-              <a:t>/</a:t>
+              <a:t>user1/</a:t>
             </a:r>
             <a:r>
               <a:rPr lang="de-DE" sz="1400" b="1" dirty="0" err="1"/>
@@ -21035,13 +21601,10 @@
           </a:bodyPr>
           <a:lstStyle/>
           <a:p>
-            <a:r>
-              <a:rPr lang="de-DE" sz="1300" b="1" dirty="0" err="1"/>
-              <a:t>annalenabiel</a:t>
-            </a:r>
+            <a:pPr algn="ctr"/>
             <a:r>
               <a:rPr lang="de-DE" sz="1300" b="1" dirty="0"/>
-              <a:t>/ROSA4</a:t>
+              <a:t>user3/ROSA4</a:t>
             </a:r>
           </a:p>
         </p:txBody>
@@ -21697,7 +22260,7 @@
         </p:nvSpPr>
         <p:spPr>
           <a:xfrm>
-            <a:off x="5718850" y="4537806"/>
+            <a:off x="6479148" y="4537125"/>
             <a:ext cx="415498" cy="261610"/>
           </a:xfrm>
           <a:prstGeom prst="rect">
@@ -21733,7 +22296,7 @@
         </p:nvSpPr>
         <p:spPr>
           <a:xfrm>
-            <a:off x="8461604" y="2882139"/>
+            <a:off x="7715279" y="2804300"/>
             <a:ext cx="415498" cy="261610"/>
           </a:xfrm>
           <a:prstGeom prst="rect">
@@ -21843,7 +22406,7 @@
         </p:nvSpPr>
         <p:spPr>
           <a:xfrm>
-            <a:off x="5245205" y="2519201"/>
+            <a:off x="5192833" y="2857447"/>
             <a:ext cx="1798890" cy="261610"/>
           </a:xfrm>
           <a:prstGeom prst="rect">
@@ -22628,7 +23191,7 @@
         </p:nvSpPr>
         <p:spPr>
           <a:xfrm>
-            <a:off x="5780526" y="1972006"/>
+            <a:off x="6511713" y="1977606"/>
             <a:ext cx="415498" cy="261610"/>
           </a:xfrm>
           <a:prstGeom prst="rect">
@@ -22684,12 +23247,8 @@
           <a:p>
             <a:pPr algn="ctr"/>
             <a:r>
-              <a:rPr lang="de-DE" sz="1400" b="1" dirty="0" err="1"/>
-              <a:t>nabusch</a:t>
-            </a:r>
-            <a:r>
               <a:rPr lang="de-DE" sz="1400" b="1" dirty="0"/>
-              <a:t>/</a:t>
+              <a:t>user2/</a:t>
             </a:r>
             <a:r>
               <a:rPr lang="de-DE" sz="1400" b="1" dirty="0" err="1"/>
@@ -23204,7 +23763,7 @@
         </p:nvSpPr>
         <p:spPr>
           <a:xfrm>
-            <a:off x="5294907" y="829601"/>
+            <a:off x="5294272" y="709586"/>
             <a:ext cx="553357" cy="261610"/>
           </a:xfrm>
           <a:prstGeom prst="rect">
@@ -24346,40 +24905,6 @@
             <a:r>
               <a:rPr lang="de-DE" sz="1100" dirty="0"/>
               <a:t>push</a:t>
-            </a:r>
-          </a:p>
-        </p:txBody>
-      </p:sp>
-      <p:sp>
-        <p:nvSpPr>
-          <p:cNvPr id="2" name="Rechteck 1">
-            <a:extLst>
-              <a:ext uri="{FF2B5EF4-FFF2-40B4-BE49-F238E27FC236}">
-                <a16:creationId xmlns:a16="http://schemas.microsoft.com/office/drawing/2014/main" id="{0125F9A3-0B21-4AB3-8F20-39DACF84429C}"/>
-              </a:ext>
-            </a:extLst>
-          </p:cNvPr>
-          <p:cNvSpPr/>
-          <p:nvPr/>
-        </p:nvSpPr>
-        <p:spPr>
-          <a:xfrm>
-            <a:off x="689605" y="5879301"/>
-            <a:ext cx="3102644" cy="707886"/>
-          </a:xfrm>
-          <a:prstGeom prst="rect">
-            <a:avLst/>
-          </a:prstGeom>
-        </p:spPr>
-        <p:txBody>
-          <a:bodyPr wrap="none">
-            <a:spAutoFit/>
-          </a:bodyPr>
-          <a:lstStyle/>
-          <a:p>
-            <a:r>
-              <a:rPr lang="de-DE" sz="4000" dirty="0"/>
-              <a:t>The Workflow</a:t>
             </a:r>
           </a:p>
         </p:txBody>
@@ -27098,109 +27623,3716 @@
       </p:grpSpPr>
       <p:sp>
         <p:nvSpPr>
-          <p:cNvPr id="2" name="Titel 1">
-            <a:extLst>
-              <a:ext uri="{FF2B5EF4-FFF2-40B4-BE49-F238E27FC236}">
-                <a16:creationId xmlns:a16="http://schemas.microsoft.com/office/drawing/2014/main" id="{E22E3B27-615A-4221-BFE7-450D563FEC17}"/>
-              </a:ext>
-            </a:extLst>
-          </p:cNvPr>
-          <p:cNvSpPr>
-            <a:spLocks noGrp="1"/>
-          </p:cNvSpPr>
-          <p:nvPr>
-            <p:ph type="title"/>
-          </p:nvPr>
+          <p:cNvPr id="59" name="Rechteck 58">
+            <a:extLst>
+              <a:ext uri="{FF2B5EF4-FFF2-40B4-BE49-F238E27FC236}">
+                <a16:creationId xmlns:a16="http://schemas.microsoft.com/office/drawing/2014/main" id="{E34E26B7-2C16-20A0-E73E-AD1CF9350B67}"/>
+              </a:ext>
+            </a:extLst>
+          </p:cNvPr>
+          <p:cNvSpPr/>
+          <p:nvPr/>
         </p:nvSpPr>
-        <p:spPr/>
+        <p:spPr>
+          <a:xfrm>
+            <a:off x="4770408" y="275076"/>
+            <a:ext cx="1826141" cy="6497629"/>
+          </a:xfrm>
+          <a:prstGeom prst="rect">
+            <a:avLst/>
+          </a:prstGeom>
+          <a:solidFill>
+            <a:schemeClr val="accent1">
+              <a:lumMod val="20000"/>
+              <a:lumOff val="80000"/>
+            </a:schemeClr>
+          </a:solidFill>
+          <a:ln>
+            <a:noFill/>
+          </a:ln>
+        </p:spPr>
+        <p:style>
+          <a:lnRef idx="2">
+            <a:schemeClr val="accent1">
+              <a:shade val="50000"/>
+            </a:schemeClr>
+          </a:lnRef>
+          <a:fillRef idx="1">
+            <a:schemeClr val="accent1"/>
+          </a:fillRef>
+          <a:effectRef idx="0">
+            <a:schemeClr val="accent1"/>
+          </a:effectRef>
+          <a:fontRef idx="minor">
+            <a:schemeClr val="lt1"/>
+          </a:fontRef>
+        </p:style>
         <p:txBody>
-          <a:bodyPr/>
+          <a:bodyPr rtlCol="0" anchor="ctr"/>
           <a:lstStyle/>
           <a:p>
             <a:pPr algn="ctr"/>
-            <a:r>
-              <a:rPr lang="de-DE" dirty="0"/>
-              <a:t>Hands on</a:t>
-            </a:r>
+            <a:endParaRPr lang="de-DE"/>
           </a:p>
         </p:txBody>
       </p:sp>
-      <p:pic>
-        <p:nvPicPr>
-          <p:cNvPr id="6" name="Grafik 5">
-            <a:extLst>
-              <a:ext uri="{FF2B5EF4-FFF2-40B4-BE49-F238E27FC236}">
-                <a16:creationId xmlns:a16="http://schemas.microsoft.com/office/drawing/2014/main" id="{B28AA8C1-22F6-4F07-B138-419B79429575}"/>
-              </a:ext>
-            </a:extLst>
-          </p:cNvPr>
-          <p:cNvPicPr>
-            <a:picLocks noChangeAspect="1"/>
-          </p:cNvPicPr>
-          <p:nvPr/>
-        </p:nvPicPr>
-        <p:blipFill>
-          <a:blip r:embed="rId2"/>
-          <a:stretch>
-            <a:fillRect/>
-          </a:stretch>
-        </p:blipFill>
+      <p:sp>
+        <p:nvSpPr>
+          <p:cNvPr id="70" name="Textfeld 69">
+            <a:extLst>
+              <a:ext uri="{FF2B5EF4-FFF2-40B4-BE49-F238E27FC236}">
+                <a16:creationId xmlns:a16="http://schemas.microsoft.com/office/drawing/2014/main" id="{BD997A6E-18DD-608C-1D7F-94B988FF7158}"/>
+              </a:ext>
+            </a:extLst>
+          </p:cNvPr>
+          <p:cNvSpPr txBox="1"/>
+          <p:nvPr/>
+        </p:nvSpPr>
         <p:spPr>
           <a:xfrm>
-            <a:off x="2224085" y="4476023"/>
-            <a:ext cx="7743825" cy="1819275"/>
+            <a:off x="4770408" y="6249485"/>
+            <a:ext cx="1826141" cy="523220"/>
           </a:xfrm>
           <a:prstGeom prst="rect">
             <a:avLst/>
           </a:prstGeom>
-        </p:spPr>
-      </p:pic>
-      <p:pic>
-        <p:nvPicPr>
-          <p:cNvPr id="4" name="Grafik 3">
-            <a:extLst>
-              <a:ext uri="{FF2B5EF4-FFF2-40B4-BE49-F238E27FC236}">
-                <a16:creationId xmlns:a16="http://schemas.microsoft.com/office/drawing/2014/main" id="{AD20252C-FB57-465A-ADDB-7E905D832B29}"/>
-              </a:ext>
-            </a:extLst>
-          </p:cNvPr>
-          <p:cNvPicPr>
-            <a:picLocks noChangeAspect="1"/>
-          </p:cNvPicPr>
-          <p:nvPr/>
-        </p:nvPicPr>
-        <p:blipFill>
-          <a:blip r:embed="rId3">
-            <a:extLst>
-              <a:ext uri="{28A0092B-C50C-407E-A947-70E740481C1C}">
-                <a14:useLocalDpi xmlns:a14="http://schemas.microsoft.com/office/drawing/2010/main" val="0"/>
-              </a:ext>
-            </a:extLst>
-          </a:blip>
-          <a:stretch>
-            <a:fillRect/>
-          </a:stretch>
-        </p:blipFill>
+          <a:solidFill>
+            <a:schemeClr val="bg1">
+              <a:lumMod val="65000"/>
+            </a:schemeClr>
+          </a:solidFill>
+        </p:spPr>
+        <p:txBody>
+          <a:bodyPr wrap="none" rtlCol="0">
+            <a:spAutoFit/>
+          </a:bodyPr>
+          <a:lstStyle/>
+          <a:p>
+            <a:pPr algn="ctr"/>
+            <a:r>
+              <a:rPr lang="de-DE" sz="1400" b="1" dirty="0"/>
+              <a:t>buschlab-</a:t>
+            </a:r>
+            <a:r>
+              <a:rPr lang="de-DE" sz="1400" b="1" dirty="0" err="1"/>
+              <a:t>muenster</a:t>
+            </a:r>
+            <a:r>
+              <a:rPr lang="de-DE" sz="1400" b="1" dirty="0"/>
+              <a:t>/</a:t>
+            </a:r>
+          </a:p>
+          <a:p>
+            <a:pPr algn="ctr"/>
+            <a:r>
+              <a:rPr lang="de-DE" sz="1400" b="1" dirty="0"/>
+              <a:t>buschlab-</a:t>
+            </a:r>
+            <a:r>
+              <a:rPr lang="de-DE" sz="1400" b="1" dirty="0" err="1"/>
+              <a:t>eeg</a:t>
+            </a:r>
+            <a:r>
+              <a:rPr lang="de-DE" sz="1400" b="1" dirty="0"/>
+              <a:t>-pipeline</a:t>
+            </a:r>
+          </a:p>
+        </p:txBody>
+      </p:sp>
+      <p:sp>
+        <p:nvSpPr>
+          <p:cNvPr id="72" name="Rechteck 71">
+            <a:extLst>
+              <a:ext uri="{FF2B5EF4-FFF2-40B4-BE49-F238E27FC236}">
+                <a16:creationId xmlns:a16="http://schemas.microsoft.com/office/drawing/2014/main" id="{E5FDD9FE-1DD6-2DE8-C21C-D9ACFC291A90}"/>
+              </a:ext>
+            </a:extLst>
+          </p:cNvPr>
+          <p:cNvSpPr/>
+          <p:nvPr/>
+        </p:nvSpPr>
         <p:spPr>
           <a:xfrm>
-            <a:off x="5024434" y="1797803"/>
-            <a:ext cx="2143125" cy="2143125"/>
+            <a:off x="990902" y="275076"/>
+            <a:ext cx="3292115" cy="5475805"/>
           </a:xfrm>
           <a:prstGeom prst="rect">
             <a:avLst/>
           </a:prstGeom>
-        </p:spPr>
-      </p:pic>
+          <a:solidFill>
+            <a:schemeClr val="accent4">
+              <a:lumMod val="20000"/>
+              <a:lumOff val="80000"/>
+            </a:schemeClr>
+          </a:solidFill>
+          <a:ln>
+            <a:noFill/>
+          </a:ln>
+        </p:spPr>
+        <p:style>
+          <a:lnRef idx="2">
+            <a:schemeClr val="accent1">
+              <a:shade val="50000"/>
+            </a:schemeClr>
+          </a:lnRef>
+          <a:fillRef idx="1">
+            <a:schemeClr val="accent1"/>
+          </a:fillRef>
+          <a:effectRef idx="0">
+            <a:schemeClr val="accent1"/>
+          </a:effectRef>
+          <a:fontRef idx="minor">
+            <a:schemeClr val="lt1"/>
+          </a:fontRef>
+        </p:style>
+        <p:txBody>
+          <a:bodyPr rtlCol="0" anchor="ctr"/>
+          <a:lstStyle/>
+          <a:p>
+            <a:pPr algn="ctr"/>
+            <a:endParaRPr lang="de-DE"/>
+          </a:p>
+        </p:txBody>
+      </p:sp>
+      <p:sp>
+        <p:nvSpPr>
+          <p:cNvPr id="132" name="Rechteck 131">
+            <a:extLst>
+              <a:ext uri="{FF2B5EF4-FFF2-40B4-BE49-F238E27FC236}">
+                <a16:creationId xmlns:a16="http://schemas.microsoft.com/office/drawing/2014/main" id="{1E3E726C-F9DD-7C94-0EEB-5DC4ACD68CC7}"/>
+              </a:ext>
+            </a:extLst>
+          </p:cNvPr>
+          <p:cNvSpPr/>
+          <p:nvPr/>
+        </p:nvSpPr>
+        <p:spPr>
+          <a:xfrm>
+            <a:off x="3223432" y="292933"/>
+            <a:ext cx="710227" cy="4704768"/>
+          </a:xfrm>
+          <a:prstGeom prst="rect">
+            <a:avLst/>
+          </a:prstGeom>
+          <a:solidFill>
+            <a:schemeClr val="accent4">
+              <a:lumMod val="75000"/>
+            </a:schemeClr>
+          </a:solidFill>
+          <a:ln>
+            <a:noFill/>
+          </a:ln>
+        </p:spPr>
+        <p:style>
+          <a:lnRef idx="2">
+            <a:schemeClr val="accent1">
+              <a:shade val="50000"/>
+            </a:schemeClr>
+          </a:lnRef>
+          <a:fillRef idx="1">
+            <a:schemeClr val="accent1"/>
+          </a:fillRef>
+          <a:effectRef idx="0">
+            <a:schemeClr val="accent1"/>
+          </a:effectRef>
+          <a:fontRef idx="minor">
+            <a:schemeClr val="lt1"/>
+          </a:fontRef>
+        </p:style>
+        <p:txBody>
+          <a:bodyPr rtlCol="0" anchor="ctr"/>
+          <a:lstStyle/>
+          <a:p>
+            <a:pPr algn="ctr"/>
+            <a:endParaRPr lang="de-DE"/>
+          </a:p>
+        </p:txBody>
+      </p:sp>
+      <p:sp>
+        <p:nvSpPr>
+          <p:cNvPr id="131" name="Rechteck 130">
+            <a:extLst>
+              <a:ext uri="{FF2B5EF4-FFF2-40B4-BE49-F238E27FC236}">
+                <a16:creationId xmlns:a16="http://schemas.microsoft.com/office/drawing/2014/main" id="{90737A69-8E55-60CB-01B3-4AAD622E5F0F}"/>
+              </a:ext>
+            </a:extLst>
+          </p:cNvPr>
+          <p:cNvSpPr/>
+          <p:nvPr/>
+        </p:nvSpPr>
+        <p:spPr>
+          <a:xfrm>
+            <a:off x="2182385" y="296606"/>
+            <a:ext cx="917351" cy="4269433"/>
+          </a:xfrm>
+          <a:prstGeom prst="rect">
+            <a:avLst/>
+          </a:prstGeom>
+          <a:solidFill>
+            <a:schemeClr val="accent4">
+              <a:lumMod val="60000"/>
+              <a:lumOff val="40000"/>
+            </a:schemeClr>
+          </a:solidFill>
+          <a:ln>
+            <a:noFill/>
+          </a:ln>
+        </p:spPr>
+        <p:style>
+          <a:lnRef idx="2">
+            <a:schemeClr val="accent1">
+              <a:shade val="50000"/>
+            </a:schemeClr>
+          </a:lnRef>
+          <a:fillRef idx="1">
+            <a:schemeClr val="accent1"/>
+          </a:fillRef>
+          <a:effectRef idx="0">
+            <a:schemeClr val="accent1"/>
+          </a:effectRef>
+          <a:fontRef idx="minor">
+            <a:schemeClr val="lt1"/>
+          </a:fontRef>
+        </p:style>
+        <p:txBody>
+          <a:bodyPr rtlCol="0" anchor="ctr"/>
+          <a:lstStyle/>
+          <a:p>
+            <a:pPr algn="ctr"/>
+            <a:endParaRPr lang="de-DE"/>
+          </a:p>
+        </p:txBody>
+      </p:sp>
+      <p:sp>
+        <p:nvSpPr>
+          <p:cNvPr id="34" name="Rechteck 33">
+            <a:extLst>
+              <a:ext uri="{FF2B5EF4-FFF2-40B4-BE49-F238E27FC236}">
+                <a16:creationId xmlns:a16="http://schemas.microsoft.com/office/drawing/2014/main" id="{C4A67ECE-20BE-46ED-C754-8EEB478379F7}"/>
+              </a:ext>
+            </a:extLst>
+          </p:cNvPr>
+          <p:cNvSpPr/>
+          <p:nvPr/>
+        </p:nvSpPr>
+        <p:spPr>
+          <a:xfrm>
+            <a:off x="1234424" y="275076"/>
+            <a:ext cx="824265" cy="1876929"/>
+          </a:xfrm>
+          <a:prstGeom prst="rect">
+            <a:avLst/>
+          </a:prstGeom>
+          <a:solidFill>
+            <a:schemeClr val="accent4">
+              <a:lumMod val="40000"/>
+              <a:lumOff val="60000"/>
+            </a:schemeClr>
+          </a:solidFill>
+          <a:ln>
+            <a:noFill/>
+          </a:ln>
+        </p:spPr>
+        <p:style>
+          <a:lnRef idx="2">
+            <a:schemeClr val="accent1">
+              <a:shade val="50000"/>
+            </a:schemeClr>
+          </a:lnRef>
+          <a:fillRef idx="1">
+            <a:schemeClr val="accent1"/>
+          </a:fillRef>
+          <a:effectRef idx="0">
+            <a:schemeClr val="accent1"/>
+          </a:effectRef>
+          <a:fontRef idx="minor">
+            <a:schemeClr val="lt1"/>
+          </a:fontRef>
+        </p:style>
+        <p:txBody>
+          <a:bodyPr rtlCol="0" anchor="ctr"/>
+          <a:lstStyle/>
+          <a:p>
+            <a:pPr algn="ctr"/>
+            <a:endParaRPr lang="de-DE"/>
+          </a:p>
+        </p:txBody>
+      </p:sp>
+      <p:sp>
+        <p:nvSpPr>
+          <p:cNvPr id="73" name="Textfeld 72">
+            <a:extLst>
+              <a:ext uri="{FF2B5EF4-FFF2-40B4-BE49-F238E27FC236}">
+                <a16:creationId xmlns:a16="http://schemas.microsoft.com/office/drawing/2014/main" id="{A8E473F7-AB76-6F50-69D1-A5BB6C3CF35D}"/>
+              </a:ext>
+            </a:extLst>
+          </p:cNvPr>
+          <p:cNvSpPr txBox="1"/>
+          <p:nvPr/>
+        </p:nvSpPr>
+        <p:spPr>
+          <a:xfrm>
+            <a:off x="897147" y="5216822"/>
+            <a:ext cx="3385870" cy="523220"/>
+          </a:xfrm>
+          <a:prstGeom prst="rect">
+            <a:avLst/>
+          </a:prstGeom>
+          <a:solidFill>
+            <a:schemeClr val="bg1">
+              <a:lumMod val="65000"/>
+            </a:schemeClr>
+          </a:solidFill>
+        </p:spPr>
+        <p:txBody>
+          <a:bodyPr wrap="square" rtlCol="0">
+            <a:spAutoFit/>
+          </a:bodyPr>
+          <a:lstStyle/>
+          <a:p>
+            <a:pPr algn="ctr"/>
+            <a:r>
+              <a:rPr lang="de-DE" sz="1400" b="1" dirty="0"/>
+              <a:t>user1/</a:t>
+            </a:r>
+          </a:p>
+          <a:p>
+            <a:pPr algn="ctr"/>
+            <a:r>
+              <a:rPr lang="de-DE" sz="1400" b="1" dirty="0"/>
+              <a:t>buschlab-</a:t>
+            </a:r>
+            <a:r>
+              <a:rPr lang="de-DE" sz="1400" b="1" dirty="0" err="1"/>
+              <a:t>eeg</a:t>
+            </a:r>
+            <a:r>
+              <a:rPr lang="de-DE" sz="1400" b="1" dirty="0"/>
+              <a:t>-pipeline</a:t>
+            </a:r>
+          </a:p>
+        </p:txBody>
+      </p:sp>
+      <p:cxnSp>
+        <p:nvCxnSpPr>
+          <p:cNvPr id="89" name="Gerade Verbindung mit Pfeil 88">
+            <a:extLst>
+              <a:ext uri="{FF2B5EF4-FFF2-40B4-BE49-F238E27FC236}">
+                <a16:creationId xmlns:a16="http://schemas.microsoft.com/office/drawing/2014/main" id="{32D9819F-8460-6223-A4CF-CFCF710AC8DF}"/>
+              </a:ext>
+            </a:extLst>
+          </p:cNvPr>
+          <p:cNvCxnSpPr>
+            <a:cxnSpLocks/>
+          </p:cNvCxnSpPr>
+          <p:nvPr/>
+        </p:nvCxnSpPr>
+        <p:spPr>
+          <a:xfrm flipV="1">
+            <a:off x="5715298" y="5502385"/>
+            <a:ext cx="0" cy="747100"/>
+          </a:xfrm>
+          <a:prstGeom prst="straightConnector1">
+            <a:avLst/>
+          </a:prstGeom>
+          <a:ln>
+            <a:tailEnd type="triangle"/>
+          </a:ln>
+        </p:spPr>
+        <p:style>
+          <a:lnRef idx="3">
+            <a:schemeClr val="dk1"/>
+          </a:lnRef>
+          <a:fillRef idx="0">
+            <a:schemeClr val="dk1"/>
+          </a:fillRef>
+          <a:effectRef idx="2">
+            <a:schemeClr val="dk1"/>
+          </a:effectRef>
+          <a:fontRef idx="minor">
+            <a:schemeClr val="tx1"/>
+          </a:fontRef>
+        </p:style>
+      </p:cxnSp>
+      <p:cxnSp>
+        <p:nvCxnSpPr>
+          <p:cNvPr id="92" name="Gerade Verbindung mit Pfeil 91">
+            <a:extLst>
+              <a:ext uri="{FF2B5EF4-FFF2-40B4-BE49-F238E27FC236}">
+                <a16:creationId xmlns:a16="http://schemas.microsoft.com/office/drawing/2014/main" id="{91CEF41A-27E5-60FA-36BD-377693ECDB02}"/>
+              </a:ext>
+            </a:extLst>
+          </p:cNvPr>
+          <p:cNvCxnSpPr>
+            <a:cxnSpLocks/>
+          </p:cNvCxnSpPr>
+          <p:nvPr/>
+        </p:nvCxnSpPr>
+        <p:spPr>
+          <a:xfrm flipV="1">
+            <a:off x="5715298" y="4688626"/>
+            <a:ext cx="0" cy="747100"/>
+          </a:xfrm>
+          <a:prstGeom prst="straightConnector1">
+            <a:avLst/>
+          </a:prstGeom>
+          <a:ln>
+            <a:tailEnd type="triangle"/>
+          </a:ln>
+        </p:spPr>
+        <p:style>
+          <a:lnRef idx="3">
+            <a:schemeClr val="dk1"/>
+          </a:lnRef>
+          <a:fillRef idx="0">
+            <a:schemeClr val="dk1"/>
+          </a:fillRef>
+          <a:effectRef idx="2">
+            <a:schemeClr val="dk1"/>
+          </a:effectRef>
+          <a:fontRef idx="minor">
+            <a:schemeClr val="tx1"/>
+          </a:fontRef>
+        </p:style>
+      </p:cxnSp>
+      <p:cxnSp>
+        <p:nvCxnSpPr>
+          <p:cNvPr id="94" name="Gerade Verbindung mit Pfeil 93">
+            <a:extLst>
+              <a:ext uri="{FF2B5EF4-FFF2-40B4-BE49-F238E27FC236}">
+                <a16:creationId xmlns:a16="http://schemas.microsoft.com/office/drawing/2014/main" id="{5B5ACF1C-5A89-D15D-822E-752B926581E3}"/>
+              </a:ext>
+            </a:extLst>
+          </p:cNvPr>
+          <p:cNvCxnSpPr>
+            <a:cxnSpLocks/>
+          </p:cNvCxnSpPr>
+          <p:nvPr/>
+        </p:nvCxnSpPr>
+        <p:spPr>
+          <a:xfrm flipH="1">
+            <a:off x="3519577" y="4551097"/>
+            <a:ext cx="2190730" cy="0"/>
+          </a:xfrm>
+          <a:prstGeom prst="straightConnector1">
+            <a:avLst/>
+          </a:prstGeom>
+          <a:ln>
+            <a:tailEnd type="triangle"/>
+          </a:ln>
+        </p:spPr>
+        <p:style>
+          <a:lnRef idx="3">
+            <a:schemeClr val="dk1"/>
+          </a:lnRef>
+          <a:fillRef idx="0">
+            <a:schemeClr val="dk1"/>
+          </a:fillRef>
+          <a:effectRef idx="2">
+            <a:schemeClr val="dk1"/>
+          </a:effectRef>
+          <a:fontRef idx="minor">
+            <a:schemeClr val="tx1"/>
+          </a:fontRef>
+        </p:style>
+      </p:cxnSp>
+      <p:sp>
+        <p:nvSpPr>
+          <p:cNvPr id="95" name="Textfeld 94">
+            <a:extLst>
+              <a:ext uri="{FF2B5EF4-FFF2-40B4-BE49-F238E27FC236}">
+                <a16:creationId xmlns:a16="http://schemas.microsoft.com/office/drawing/2014/main" id="{A290A1BB-D0D5-86F6-F94E-CB3E09722ADE}"/>
+              </a:ext>
+            </a:extLst>
+          </p:cNvPr>
+          <p:cNvSpPr txBox="1"/>
+          <p:nvPr/>
+        </p:nvSpPr>
+        <p:spPr>
+          <a:xfrm>
+            <a:off x="4266323" y="4582203"/>
+            <a:ext cx="415498" cy="261610"/>
+          </a:xfrm>
+          <a:prstGeom prst="rect">
+            <a:avLst/>
+          </a:prstGeom>
+          <a:noFill/>
+        </p:spPr>
+        <p:txBody>
+          <a:bodyPr wrap="square" rtlCol="0">
+            <a:spAutoFit/>
+          </a:bodyPr>
+          <a:lstStyle/>
+          <a:p>
+            <a:r>
+              <a:rPr lang="de-DE" sz="1100" dirty="0" err="1"/>
+              <a:t>fork</a:t>
+            </a:r>
+            <a:endParaRPr lang="de-DE" sz="1100" dirty="0"/>
+          </a:p>
+        </p:txBody>
+      </p:sp>
+      <p:sp>
+        <p:nvSpPr>
+          <p:cNvPr id="96" name="Textfeld 95">
+            <a:extLst>
+              <a:ext uri="{FF2B5EF4-FFF2-40B4-BE49-F238E27FC236}">
+                <a16:creationId xmlns:a16="http://schemas.microsoft.com/office/drawing/2014/main" id="{FCC4A771-C018-8725-7197-CFE87605C785}"/>
+              </a:ext>
+            </a:extLst>
+          </p:cNvPr>
+          <p:cNvSpPr txBox="1"/>
+          <p:nvPr/>
+        </p:nvSpPr>
+        <p:spPr>
+          <a:xfrm>
+            <a:off x="3215682" y="4689924"/>
+            <a:ext cx="703078" cy="307777"/>
+          </a:xfrm>
+          <a:prstGeom prst="rect">
+            <a:avLst/>
+          </a:prstGeom>
+          <a:noFill/>
+        </p:spPr>
+        <p:txBody>
+          <a:bodyPr wrap="none" rtlCol="0">
+            <a:spAutoFit/>
+          </a:bodyPr>
+          <a:lstStyle/>
+          <a:p>
+            <a:r>
+              <a:rPr lang="de-DE" sz="1400" b="1" dirty="0" err="1"/>
+              <a:t>master</a:t>
+            </a:r>
+            <a:endParaRPr lang="de-DE" sz="1400" b="1" dirty="0"/>
+          </a:p>
+        </p:txBody>
+      </p:sp>
+      <p:cxnSp>
+        <p:nvCxnSpPr>
+          <p:cNvPr id="97" name="Gerade Verbindung mit Pfeil 96">
+            <a:extLst>
+              <a:ext uri="{FF2B5EF4-FFF2-40B4-BE49-F238E27FC236}">
+                <a16:creationId xmlns:a16="http://schemas.microsoft.com/office/drawing/2014/main" id="{14B0DD4E-49F7-46E3-9123-DFC523A36C46}"/>
+              </a:ext>
+            </a:extLst>
+          </p:cNvPr>
+          <p:cNvCxnSpPr>
+            <a:cxnSpLocks/>
+          </p:cNvCxnSpPr>
+          <p:nvPr/>
+        </p:nvCxnSpPr>
+        <p:spPr>
+          <a:xfrm flipH="1" flipV="1">
+            <a:off x="2579226" y="3864634"/>
+            <a:ext cx="896088" cy="594124"/>
+          </a:xfrm>
+          <a:prstGeom prst="straightConnector1">
+            <a:avLst/>
+          </a:prstGeom>
+          <a:ln>
+            <a:tailEnd type="triangle"/>
+          </a:ln>
+        </p:spPr>
+        <p:style>
+          <a:lnRef idx="3">
+            <a:schemeClr val="dk1"/>
+          </a:lnRef>
+          <a:fillRef idx="0">
+            <a:schemeClr val="dk1"/>
+          </a:fillRef>
+          <a:effectRef idx="2">
+            <a:schemeClr val="dk1"/>
+          </a:effectRef>
+          <a:fontRef idx="minor">
+            <a:schemeClr val="tx1"/>
+          </a:fontRef>
+        </p:style>
+      </p:cxnSp>
+      <p:sp>
+        <p:nvSpPr>
+          <p:cNvPr id="98" name="Textfeld 97">
+            <a:extLst>
+              <a:ext uri="{FF2B5EF4-FFF2-40B4-BE49-F238E27FC236}">
+                <a16:creationId xmlns:a16="http://schemas.microsoft.com/office/drawing/2014/main" id="{86E46838-A87E-76B1-7447-88CC428AD8A7}"/>
+              </a:ext>
+            </a:extLst>
+          </p:cNvPr>
+          <p:cNvSpPr txBox="1"/>
+          <p:nvPr/>
+        </p:nvSpPr>
+        <p:spPr>
+          <a:xfrm>
+            <a:off x="2225004" y="4002020"/>
+            <a:ext cx="836447" cy="523220"/>
+          </a:xfrm>
+          <a:prstGeom prst="rect">
+            <a:avLst/>
+          </a:prstGeom>
+          <a:noFill/>
+        </p:spPr>
+        <p:txBody>
+          <a:bodyPr wrap="none" rtlCol="0">
+            <a:spAutoFit/>
+          </a:bodyPr>
+          <a:lstStyle/>
+          <a:p>
+            <a:pPr algn="ctr"/>
+            <a:r>
+              <a:rPr lang="de-DE" sz="1400" b="1" dirty="0"/>
+              <a:t>Alpha</a:t>
+            </a:r>
+          </a:p>
+          <a:p>
+            <a:pPr algn="ctr"/>
+            <a:r>
+              <a:rPr lang="de-DE" sz="1400" b="1" dirty="0"/>
+              <a:t>Ultimate</a:t>
+            </a:r>
+          </a:p>
+        </p:txBody>
+      </p:sp>
+      <p:sp>
+        <p:nvSpPr>
+          <p:cNvPr id="99" name="Textfeld 98">
+            <a:extLst>
+              <a:ext uri="{FF2B5EF4-FFF2-40B4-BE49-F238E27FC236}">
+                <a16:creationId xmlns:a16="http://schemas.microsoft.com/office/drawing/2014/main" id="{78E7A83C-1DB0-8375-5BF4-1FA14492A2A1}"/>
+              </a:ext>
+            </a:extLst>
+          </p:cNvPr>
+          <p:cNvSpPr txBox="1"/>
+          <p:nvPr/>
+        </p:nvSpPr>
+        <p:spPr>
+          <a:xfrm rot="2123970">
+            <a:off x="2883830" y="3882573"/>
+            <a:ext cx="610661" cy="261610"/>
+          </a:xfrm>
+          <a:prstGeom prst="rect">
+            <a:avLst/>
+          </a:prstGeom>
+          <a:noFill/>
+        </p:spPr>
+        <p:txBody>
+          <a:bodyPr wrap="square" rtlCol="0">
+            <a:spAutoFit/>
+          </a:bodyPr>
+          <a:lstStyle/>
+          <a:p>
+            <a:r>
+              <a:rPr lang="de-DE" sz="1100" dirty="0" err="1"/>
+              <a:t>branch</a:t>
+            </a:r>
+            <a:endParaRPr lang="de-DE" sz="1100" dirty="0"/>
+          </a:p>
+        </p:txBody>
+      </p:sp>
+      <p:cxnSp>
+        <p:nvCxnSpPr>
+          <p:cNvPr id="100" name="Gerade Verbindung mit Pfeil 99">
+            <a:extLst>
+              <a:ext uri="{FF2B5EF4-FFF2-40B4-BE49-F238E27FC236}">
+                <a16:creationId xmlns:a16="http://schemas.microsoft.com/office/drawing/2014/main" id="{E3D946E3-EB3F-471E-203C-C59920A023CF}"/>
+              </a:ext>
+            </a:extLst>
+          </p:cNvPr>
+          <p:cNvCxnSpPr>
+            <a:cxnSpLocks/>
+          </p:cNvCxnSpPr>
+          <p:nvPr/>
+        </p:nvCxnSpPr>
+        <p:spPr>
+          <a:xfrm flipV="1">
+            <a:off x="2600743" y="3080207"/>
+            <a:ext cx="0" cy="747100"/>
+          </a:xfrm>
+          <a:prstGeom prst="straightConnector1">
+            <a:avLst/>
+          </a:prstGeom>
+          <a:ln>
+            <a:tailEnd type="triangle"/>
+          </a:ln>
+        </p:spPr>
+        <p:style>
+          <a:lnRef idx="3">
+            <a:schemeClr val="dk1"/>
+          </a:lnRef>
+          <a:fillRef idx="0">
+            <a:schemeClr val="dk1"/>
+          </a:fillRef>
+          <a:effectRef idx="2">
+            <a:schemeClr val="dk1"/>
+          </a:effectRef>
+          <a:fontRef idx="minor">
+            <a:schemeClr val="tx1"/>
+          </a:fontRef>
+        </p:style>
+      </p:cxnSp>
+      <p:cxnSp>
+        <p:nvCxnSpPr>
+          <p:cNvPr id="101" name="Gerade Verbindung mit Pfeil 100">
+            <a:extLst>
+              <a:ext uri="{FF2B5EF4-FFF2-40B4-BE49-F238E27FC236}">
+                <a16:creationId xmlns:a16="http://schemas.microsoft.com/office/drawing/2014/main" id="{234C624A-14DA-333D-7231-DAF1B49AAF0A}"/>
+              </a:ext>
+            </a:extLst>
+          </p:cNvPr>
+          <p:cNvCxnSpPr>
+            <a:cxnSpLocks/>
+          </p:cNvCxnSpPr>
+          <p:nvPr/>
+        </p:nvCxnSpPr>
+        <p:spPr>
+          <a:xfrm flipH="1" flipV="1">
+            <a:off x="2598128" y="2511373"/>
+            <a:ext cx="1480" cy="472766"/>
+          </a:xfrm>
+          <a:prstGeom prst="straightConnector1">
+            <a:avLst/>
+          </a:prstGeom>
+          <a:ln>
+            <a:tailEnd type="triangle"/>
+          </a:ln>
+        </p:spPr>
+        <p:style>
+          <a:lnRef idx="3">
+            <a:schemeClr val="dk1"/>
+          </a:lnRef>
+          <a:fillRef idx="0">
+            <a:schemeClr val="dk1"/>
+          </a:fillRef>
+          <a:effectRef idx="2">
+            <a:schemeClr val="dk1"/>
+          </a:effectRef>
+          <a:fontRef idx="minor">
+            <a:schemeClr val="tx1"/>
+          </a:fontRef>
+        </p:style>
+      </p:cxnSp>
+      <p:cxnSp>
+        <p:nvCxnSpPr>
+          <p:cNvPr id="102" name="Gerade Verbindung mit Pfeil 101">
+            <a:extLst>
+              <a:ext uri="{FF2B5EF4-FFF2-40B4-BE49-F238E27FC236}">
+                <a16:creationId xmlns:a16="http://schemas.microsoft.com/office/drawing/2014/main" id="{F6428D56-E5DA-890B-D261-440B1D774A2E}"/>
+              </a:ext>
+            </a:extLst>
+          </p:cNvPr>
+          <p:cNvCxnSpPr>
+            <a:cxnSpLocks/>
+          </p:cNvCxnSpPr>
+          <p:nvPr/>
+        </p:nvCxnSpPr>
+        <p:spPr>
+          <a:xfrm flipV="1">
+            <a:off x="2649587" y="2237039"/>
+            <a:ext cx="753680" cy="795134"/>
+          </a:xfrm>
+          <a:prstGeom prst="straightConnector1">
+            <a:avLst/>
+          </a:prstGeom>
+          <a:ln>
+            <a:tailEnd type="triangle"/>
+          </a:ln>
+        </p:spPr>
+        <p:style>
+          <a:lnRef idx="3">
+            <a:schemeClr val="dk1"/>
+          </a:lnRef>
+          <a:fillRef idx="0">
+            <a:schemeClr val="dk1"/>
+          </a:fillRef>
+          <a:effectRef idx="2">
+            <a:schemeClr val="dk1"/>
+          </a:effectRef>
+          <a:fontRef idx="minor">
+            <a:schemeClr val="tx1"/>
+          </a:fontRef>
+        </p:style>
+      </p:cxnSp>
+      <p:cxnSp>
+        <p:nvCxnSpPr>
+          <p:cNvPr id="103" name="Gerade Verbindung mit Pfeil 102">
+            <a:extLst>
+              <a:ext uri="{FF2B5EF4-FFF2-40B4-BE49-F238E27FC236}">
+                <a16:creationId xmlns:a16="http://schemas.microsoft.com/office/drawing/2014/main" id="{9F09AFA7-38E6-714F-D212-FE64AC5CC1DC}"/>
+              </a:ext>
+            </a:extLst>
+          </p:cNvPr>
+          <p:cNvCxnSpPr>
+            <a:cxnSpLocks/>
+          </p:cNvCxnSpPr>
+          <p:nvPr/>
+        </p:nvCxnSpPr>
+        <p:spPr>
+          <a:xfrm flipV="1">
+            <a:off x="3513818" y="2237039"/>
+            <a:ext cx="19196" cy="2221719"/>
+          </a:xfrm>
+          <a:prstGeom prst="straightConnector1">
+            <a:avLst/>
+          </a:prstGeom>
+          <a:ln>
+            <a:solidFill>
+              <a:schemeClr val="bg1">
+                <a:lumMod val="50000"/>
+              </a:schemeClr>
+            </a:solidFill>
+            <a:tailEnd type="triangle"/>
+          </a:ln>
+        </p:spPr>
+        <p:style>
+          <a:lnRef idx="3">
+            <a:schemeClr val="dk1"/>
+          </a:lnRef>
+          <a:fillRef idx="0">
+            <a:schemeClr val="dk1"/>
+          </a:fillRef>
+          <a:effectRef idx="2">
+            <a:schemeClr val="dk1"/>
+          </a:effectRef>
+          <a:fontRef idx="minor">
+            <a:schemeClr val="tx1"/>
+          </a:fontRef>
+        </p:style>
+      </p:cxnSp>
+      <p:cxnSp>
+        <p:nvCxnSpPr>
+          <p:cNvPr id="107" name="Gerade Verbindung mit Pfeil 106">
+            <a:extLst>
+              <a:ext uri="{FF2B5EF4-FFF2-40B4-BE49-F238E27FC236}">
+                <a16:creationId xmlns:a16="http://schemas.microsoft.com/office/drawing/2014/main" id="{D6D59B88-D13A-A540-240C-24C03ED591FE}"/>
+              </a:ext>
+            </a:extLst>
+          </p:cNvPr>
+          <p:cNvCxnSpPr>
+            <a:cxnSpLocks/>
+          </p:cNvCxnSpPr>
+          <p:nvPr/>
+        </p:nvCxnSpPr>
+        <p:spPr>
+          <a:xfrm>
+            <a:off x="3475314" y="2172844"/>
+            <a:ext cx="2234993" cy="1"/>
+          </a:xfrm>
+          <a:prstGeom prst="straightConnector1">
+            <a:avLst/>
+          </a:prstGeom>
+          <a:ln>
+            <a:tailEnd type="triangle"/>
+          </a:ln>
+        </p:spPr>
+        <p:style>
+          <a:lnRef idx="3">
+            <a:schemeClr val="dk1"/>
+          </a:lnRef>
+          <a:fillRef idx="0">
+            <a:schemeClr val="dk1"/>
+          </a:fillRef>
+          <a:effectRef idx="2">
+            <a:schemeClr val="dk1"/>
+          </a:effectRef>
+          <a:fontRef idx="minor">
+            <a:schemeClr val="tx1"/>
+          </a:fontRef>
+        </p:style>
+      </p:cxnSp>
+      <p:sp>
+        <p:nvSpPr>
+          <p:cNvPr id="108" name="Textfeld 107">
+            <a:extLst>
+              <a:ext uri="{FF2B5EF4-FFF2-40B4-BE49-F238E27FC236}">
+                <a16:creationId xmlns:a16="http://schemas.microsoft.com/office/drawing/2014/main" id="{48AB13DE-2F62-5540-5E21-8D73A2C87F68}"/>
+              </a:ext>
+            </a:extLst>
+          </p:cNvPr>
+          <p:cNvSpPr txBox="1"/>
+          <p:nvPr/>
+        </p:nvSpPr>
+        <p:spPr>
+          <a:xfrm>
+            <a:off x="3573856" y="1855535"/>
+            <a:ext cx="2207993" cy="261610"/>
+          </a:xfrm>
+          <a:prstGeom prst="rect">
+            <a:avLst/>
+          </a:prstGeom>
+          <a:noFill/>
+        </p:spPr>
+        <p:txBody>
+          <a:bodyPr wrap="square" rtlCol="0">
+            <a:spAutoFit/>
+          </a:bodyPr>
+          <a:lstStyle/>
+          <a:p>
+            <a:r>
+              <a:rPr lang="de-DE" sz="1100" dirty="0"/>
+              <a:t>pull </a:t>
+            </a:r>
+            <a:r>
+              <a:rPr lang="de-DE" sz="1100" dirty="0" err="1"/>
+              <a:t>request</a:t>
+            </a:r>
+            <a:r>
+              <a:rPr lang="de-DE" sz="1100" dirty="0"/>
+              <a:t> (</a:t>
+            </a:r>
+            <a:r>
+              <a:rPr lang="de-DE" sz="1100" dirty="0" err="1"/>
+              <a:t>master</a:t>
+            </a:r>
+            <a:r>
+              <a:rPr lang="de-DE" sz="1100" dirty="0"/>
+              <a:t> </a:t>
+            </a:r>
+            <a:r>
+              <a:rPr lang="de-DE" sz="1100" dirty="0" err="1"/>
+              <a:t>into</a:t>
+            </a:r>
+            <a:r>
+              <a:rPr lang="de-DE" sz="1100" dirty="0"/>
+              <a:t> </a:t>
+            </a:r>
+            <a:r>
+              <a:rPr lang="de-DE" sz="1100" dirty="0" err="1"/>
+              <a:t>master</a:t>
+            </a:r>
+            <a:r>
+              <a:rPr lang="de-DE" sz="1100" dirty="0"/>
+              <a:t>)</a:t>
+            </a:r>
+          </a:p>
+        </p:txBody>
+      </p:sp>
+      <p:cxnSp>
+        <p:nvCxnSpPr>
+          <p:cNvPr id="113" name="Gerade Verbindung mit Pfeil 112">
+            <a:extLst>
+              <a:ext uri="{FF2B5EF4-FFF2-40B4-BE49-F238E27FC236}">
+                <a16:creationId xmlns:a16="http://schemas.microsoft.com/office/drawing/2014/main" id="{EC31D548-E361-E496-51B0-6BA98DC88B95}"/>
+              </a:ext>
+            </a:extLst>
+          </p:cNvPr>
+          <p:cNvCxnSpPr>
+            <a:cxnSpLocks/>
+          </p:cNvCxnSpPr>
+          <p:nvPr/>
+        </p:nvCxnSpPr>
+        <p:spPr>
+          <a:xfrm flipV="1">
+            <a:off x="5710307" y="2346212"/>
+            <a:ext cx="0" cy="2112546"/>
+          </a:xfrm>
+          <a:prstGeom prst="straightConnector1">
+            <a:avLst/>
+          </a:prstGeom>
+          <a:ln>
+            <a:solidFill>
+              <a:schemeClr val="bg1">
+                <a:lumMod val="50000"/>
+              </a:schemeClr>
+            </a:solidFill>
+            <a:tailEnd type="triangle"/>
+          </a:ln>
+        </p:spPr>
+        <p:style>
+          <a:lnRef idx="3">
+            <a:schemeClr val="dk1"/>
+          </a:lnRef>
+          <a:fillRef idx="0">
+            <a:schemeClr val="dk1"/>
+          </a:fillRef>
+          <a:effectRef idx="2">
+            <a:schemeClr val="dk1"/>
+          </a:effectRef>
+          <a:fontRef idx="minor">
+            <a:schemeClr val="tx1"/>
+          </a:fontRef>
+        </p:style>
+      </p:cxnSp>
+      <p:cxnSp>
+        <p:nvCxnSpPr>
+          <p:cNvPr id="115" name="Gerade Verbindung mit Pfeil 114">
+            <a:extLst>
+              <a:ext uri="{FF2B5EF4-FFF2-40B4-BE49-F238E27FC236}">
+                <a16:creationId xmlns:a16="http://schemas.microsoft.com/office/drawing/2014/main" id="{AFFE4F44-44D8-D6C8-7107-F7F8635CC5B3}"/>
+              </a:ext>
+            </a:extLst>
+          </p:cNvPr>
+          <p:cNvCxnSpPr>
+            <a:cxnSpLocks/>
+          </p:cNvCxnSpPr>
+          <p:nvPr/>
+        </p:nvCxnSpPr>
+        <p:spPr>
+          <a:xfrm flipH="1" flipV="1">
+            <a:off x="1684504" y="1463706"/>
+            <a:ext cx="1712919" cy="688299"/>
+          </a:xfrm>
+          <a:prstGeom prst="straightConnector1">
+            <a:avLst/>
+          </a:prstGeom>
+          <a:ln>
+            <a:tailEnd type="triangle"/>
+          </a:ln>
+        </p:spPr>
+        <p:style>
+          <a:lnRef idx="3">
+            <a:schemeClr val="dk1"/>
+          </a:lnRef>
+          <a:fillRef idx="0">
+            <a:schemeClr val="dk1"/>
+          </a:fillRef>
+          <a:effectRef idx="2">
+            <a:schemeClr val="dk1"/>
+          </a:effectRef>
+          <a:fontRef idx="minor">
+            <a:schemeClr val="tx1"/>
+          </a:fontRef>
+        </p:style>
+      </p:cxnSp>
+      <p:sp>
+        <p:nvSpPr>
+          <p:cNvPr id="116" name="Textfeld 115">
+            <a:extLst>
+              <a:ext uri="{FF2B5EF4-FFF2-40B4-BE49-F238E27FC236}">
+                <a16:creationId xmlns:a16="http://schemas.microsoft.com/office/drawing/2014/main" id="{52B1E5AA-3EFF-687A-DA5F-63F41AAD02F8}"/>
+              </a:ext>
+            </a:extLst>
+          </p:cNvPr>
+          <p:cNvSpPr txBox="1"/>
+          <p:nvPr/>
+        </p:nvSpPr>
+        <p:spPr>
+          <a:xfrm>
+            <a:off x="1234424" y="1597497"/>
+            <a:ext cx="804644" cy="523220"/>
+          </a:xfrm>
+          <a:prstGeom prst="rect">
+            <a:avLst/>
+          </a:prstGeom>
+          <a:noFill/>
+        </p:spPr>
+        <p:txBody>
+          <a:bodyPr wrap="none" rtlCol="0">
+            <a:spAutoFit/>
+          </a:bodyPr>
+          <a:lstStyle/>
+          <a:p>
+            <a:pPr algn="ctr"/>
+            <a:r>
+              <a:rPr lang="de-DE" sz="1400" b="1" dirty="0"/>
+              <a:t>Alpha</a:t>
+            </a:r>
+          </a:p>
+          <a:p>
+            <a:pPr algn="ctr"/>
+            <a:r>
+              <a:rPr lang="de-DE" sz="1400" b="1" dirty="0"/>
+              <a:t>Extreme</a:t>
+            </a:r>
+          </a:p>
+        </p:txBody>
+      </p:sp>
+      <p:sp>
+        <p:nvSpPr>
+          <p:cNvPr id="117" name="Textfeld 116">
+            <a:extLst>
+              <a:ext uri="{FF2B5EF4-FFF2-40B4-BE49-F238E27FC236}">
+                <a16:creationId xmlns:a16="http://schemas.microsoft.com/office/drawing/2014/main" id="{0DD80E1F-91D3-42C5-CF81-7EFD94575CFB}"/>
+              </a:ext>
+            </a:extLst>
+          </p:cNvPr>
+          <p:cNvSpPr txBox="1"/>
+          <p:nvPr/>
+        </p:nvSpPr>
+        <p:spPr>
+          <a:xfrm rot="1272693">
+            <a:off x="2352819" y="1565316"/>
+            <a:ext cx="610661" cy="261610"/>
+          </a:xfrm>
+          <a:prstGeom prst="rect">
+            <a:avLst/>
+          </a:prstGeom>
+          <a:noFill/>
+        </p:spPr>
+        <p:txBody>
+          <a:bodyPr wrap="square" rtlCol="0">
+            <a:spAutoFit/>
+          </a:bodyPr>
+          <a:lstStyle/>
+          <a:p>
+            <a:r>
+              <a:rPr lang="de-DE" sz="1100" dirty="0" err="1"/>
+              <a:t>branch</a:t>
+            </a:r>
+            <a:endParaRPr lang="de-DE" sz="1100" dirty="0"/>
+          </a:p>
+        </p:txBody>
+      </p:sp>
+      <p:cxnSp>
+        <p:nvCxnSpPr>
+          <p:cNvPr id="118" name="Gerade Verbindung mit Pfeil 117">
+            <a:extLst>
+              <a:ext uri="{FF2B5EF4-FFF2-40B4-BE49-F238E27FC236}">
+                <a16:creationId xmlns:a16="http://schemas.microsoft.com/office/drawing/2014/main" id="{9EEF8A55-EBD2-67B0-9FAA-C7ABCCD00A68}"/>
+              </a:ext>
+            </a:extLst>
+          </p:cNvPr>
+          <p:cNvCxnSpPr>
+            <a:cxnSpLocks/>
+          </p:cNvCxnSpPr>
+          <p:nvPr/>
+        </p:nvCxnSpPr>
+        <p:spPr>
+          <a:xfrm flipV="1">
+            <a:off x="1656752" y="1117958"/>
+            <a:ext cx="0" cy="282356"/>
+          </a:xfrm>
+          <a:prstGeom prst="straightConnector1">
+            <a:avLst/>
+          </a:prstGeom>
+          <a:ln>
+            <a:tailEnd type="triangle"/>
+          </a:ln>
+        </p:spPr>
+        <p:style>
+          <a:lnRef idx="3">
+            <a:schemeClr val="dk1"/>
+          </a:lnRef>
+          <a:fillRef idx="0">
+            <a:schemeClr val="dk1"/>
+          </a:fillRef>
+          <a:effectRef idx="2">
+            <a:schemeClr val="dk1"/>
+          </a:effectRef>
+          <a:fontRef idx="minor">
+            <a:schemeClr val="tx1"/>
+          </a:fontRef>
+        </p:style>
+      </p:cxnSp>
+      <p:cxnSp>
+        <p:nvCxnSpPr>
+          <p:cNvPr id="120" name="Gerade Verbindung mit Pfeil 119">
+            <a:extLst>
+              <a:ext uri="{FF2B5EF4-FFF2-40B4-BE49-F238E27FC236}">
+                <a16:creationId xmlns:a16="http://schemas.microsoft.com/office/drawing/2014/main" id="{924F242F-3680-381A-76BA-02F4897B448B}"/>
+              </a:ext>
+            </a:extLst>
+          </p:cNvPr>
+          <p:cNvCxnSpPr>
+            <a:cxnSpLocks/>
+          </p:cNvCxnSpPr>
+          <p:nvPr/>
+        </p:nvCxnSpPr>
+        <p:spPr>
+          <a:xfrm flipV="1">
+            <a:off x="1656770" y="770026"/>
+            <a:ext cx="0" cy="282356"/>
+          </a:xfrm>
+          <a:prstGeom prst="straightConnector1">
+            <a:avLst/>
+          </a:prstGeom>
+          <a:ln>
+            <a:tailEnd type="triangle"/>
+          </a:ln>
+        </p:spPr>
+        <p:style>
+          <a:lnRef idx="3">
+            <a:schemeClr val="dk1"/>
+          </a:lnRef>
+          <a:fillRef idx="0">
+            <a:schemeClr val="dk1"/>
+          </a:fillRef>
+          <a:effectRef idx="2">
+            <a:schemeClr val="dk1"/>
+          </a:effectRef>
+          <a:fontRef idx="minor">
+            <a:schemeClr val="tx1"/>
+          </a:fontRef>
+        </p:style>
+      </p:cxnSp>
+      <p:sp>
+        <p:nvSpPr>
+          <p:cNvPr id="121" name="Textfeld 120">
+            <a:extLst>
+              <a:ext uri="{FF2B5EF4-FFF2-40B4-BE49-F238E27FC236}">
+                <a16:creationId xmlns:a16="http://schemas.microsoft.com/office/drawing/2014/main" id="{40FE8FEE-FD0F-A63B-2A2C-6BE0CAEEB5C7}"/>
+              </a:ext>
+            </a:extLst>
+          </p:cNvPr>
+          <p:cNvSpPr txBox="1"/>
+          <p:nvPr/>
+        </p:nvSpPr>
+        <p:spPr>
+          <a:xfrm rot="18827057">
+            <a:off x="2565604" y="2383551"/>
+            <a:ext cx="824265" cy="261610"/>
+          </a:xfrm>
+          <a:prstGeom prst="rect">
+            <a:avLst/>
+          </a:prstGeom>
+          <a:noFill/>
+        </p:spPr>
+        <p:txBody>
+          <a:bodyPr wrap="none" rtlCol="0">
+            <a:spAutoFit/>
+          </a:bodyPr>
+          <a:lstStyle/>
+          <a:p>
+            <a:r>
+              <a:rPr lang="de-DE" sz="1100" dirty="0" err="1"/>
+              <a:t>cherry</a:t>
+            </a:r>
+            <a:r>
+              <a:rPr lang="de-DE" sz="1100" dirty="0"/>
+              <a:t>-pick</a:t>
+            </a:r>
+          </a:p>
+        </p:txBody>
+      </p:sp>
+      <p:cxnSp>
+        <p:nvCxnSpPr>
+          <p:cNvPr id="122" name="Gerade Verbindung mit Pfeil 121">
+            <a:extLst>
+              <a:ext uri="{FF2B5EF4-FFF2-40B4-BE49-F238E27FC236}">
+                <a16:creationId xmlns:a16="http://schemas.microsoft.com/office/drawing/2014/main" id="{B230DBD2-FE0C-7A77-B598-FC22C455F072}"/>
+              </a:ext>
+            </a:extLst>
+          </p:cNvPr>
+          <p:cNvCxnSpPr>
+            <a:cxnSpLocks/>
+          </p:cNvCxnSpPr>
+          <p:nvPr/>
+        </p:nvCxnSpPr>
+        <p:spPr>
+          <a:xfrm>
+            <a:off x="1691410" y="770026"/>
+            <a:ext cx="1761503" cy="9084"/>
+          </a:xfrm>
+          <a:prstGeom prst="straightConnector1">
+            <a:avLst/>
+          </a:prstGeom>
+          <a:ln>
+            <a:tailEnd type="triangle"/>
+          </a:ln>
+        </p:spPr>
+        <p:style>
+          <a:lnRef idx="3">
+            <a:schemeClr val="dk1"/>
+          </a:lnRef>
+          <a:fillRef idx="0">
+            <a:schemeClr val="dk1"/>
+          </a:fillRef>
+          <a:effectRef idx="2">
+            <a:schemeClr val="dk1"/>
+          </a:effectRef>
+          <a:fontRef idx="minor">
+            <a:schemeClr val="tx1"/>
+          </a:fontRef>
+        </p:style>
+      </p:cxnSp>
+      <p:sp>
+        <p:nvSpPr>
+          <p:cNvPr id="123" name="Textfeld 122">
+            <a:extLst>
+              <a:ext uri="{FF2B5EF4-FFF2-40B4-BE49-F238E27FC236}">
+                <a16:creationId xmlns:a16="http://schemas.microsoft.com/office/drawing/2014/main" id="{D8D43088-854C-F10A-9046-891AB213BD62}"/>
+              </a:ext>
+            </a:extLst>
+          </p:cNvPr>
+          <p:cNvSpPr txBox="1"/>
+          <p:nvPr/>
+        </p:nvSpPr>
+        <p:spPr>
+          <a:xfrm rot="47949">
+            <a:off x="1650418" y="492747"/>
+            <a:ext cx="824265" cy="261610"/>
+          </a:xfrm>
+          <a:prstGeom prst="rect">
+            <a:avLst/>
+          </a:prstGeom>
+          <a:noFill/>
+        </p:spPr>
+        <p:txBody>
+          <a:bodyPr wrap="none" rtlCol="0">
+            <a:spAutoFit/>
+          </a:bodyPr>
+          <a:lstStyle/>
+          <a:p>
+            <a:r>
+              <a:rPr lang="de-DE" sz="1100" dirty="0" err="1"/>
+              <a:t>cherry</a:t>
+            </a:r>
+            <a:r>
+              <a:rPr lang="de-DE" sz="1100" dirty="0"/>
+              <a:t>-pick</a:t>
+            </a:r>
+          </a:p>
+        </p:txBody>
+      </p:sp>
+      <p:cxnSp>
+        <p:nvCxnSpPr>
+          <p:cNvPr id="124" name="Gerade Verbindung mit Pfeil 123">
+            <a:extLst>
+              <a:ext uri="{FF2B5EF4-FFF2-40B4-BE49-F238E27FC236}">
+                <a16:creationId xmlns:a16="http://schemas.microsoft.com/office/drawing/2014/main" id="{EA43D08E-45EF-AD9E-1EE4-0FFBC8C6A0EF}"/>
+              </a:ext>
+            </a:extLst>
+          </p:cNvPr>
+          <p:cNvCxnSpPr>
+            <a:cxnSpLocks/>
+          </p:cNvCxnSpPr>
+          <p:nvPr/>
+        </p:nvCxnSpPr>
+        <p:spPr>
+          <a:xfrm flipV="1">
+            <a:off x="3512683" y="839487"/>
+            <a:ext cx="18151" cy="1236916"/>
+          </a:xfrm>
+          <a:prstGeom prst="straightConnector1">
+            <a:avLst/>
+          </a:prstGeom>
+          <a:ln>
+            <a:solidFill>
+              <a:schemeClr val="bg1">
+                <a:lumMod val="50000"/>
+              </a:schemeClr>
+            </a:solidFill>
+            <a:tailEnd type="triangle"/>
+          </a:ln>
+        </p:spPr>
+        <p:style>
+          <a:lnRef idx="3">
+            <a:schemeClr val="dk1"/>
+          </a:lnRef>
+          <a:fillRef idx="0">
+            <a:schemeClr val="dk1"/>
+          </a:fillRef>
+          <a:effectRef idx="2">
+            <a:schemeClr val="dk1"/>
+          </a:effectRef>
+          <a:fontRef idx="minor">
+            <a:schemeClr val="tx1"/>
+          </a:fontRef>
+        </p:style>
+      </p:cxnSp>
+      <p:cxnSp>
+        <p:nvCxnSpPr>
+          <p:cNvPr id="126" name="Gerade Verbindung mit Pfeil 125">
+            <a:extLst>
+              <a:ext uri="{FF2B5EF4-FFF2-40B4-BE49-F238E27FC236}">
+                <a16:creationId xmlns:a16="http://schemas.microsoft.com/office/drawing/2014/main" id="{960258D7-DB78-EBB0-0F21-CAB1569F2DE2}"/>
+              </a:ext>
+            </a:extLst>
+          </p:cNvPr>
+          <p:cNvCxnSpPr>
+            <a:cxnSpLocks/>
+          </p:cNvCxnSpPr>
+          <p:nvPr/>
+        </p:nvCxnSpPr>
+        <p:spPr>
+          <a:xfrm flipV="1">
+            <a:off x="1636746" y="459445"/>
+            <a:ext cx="0" cy="282356"/>
+          </a:xfrm>
+          <a:prstGeom prst="straightConnector1">
+            <a:avLst/>
+          </a:prstGeom>
+          <a:ln>
+            <a:tailEnd type="triangle"/>
+          </a:ln>
+        </p:spPr>
+        <p:style>
+          <a:lnRef idx="3">
+            <a:schemeClr val="dk1"/>
+          </a:lnRef>
+          <a:fillRef idx="0">
+            <a:schemeClr val="dk1"/>
+          </a:fillRef>
+          <a:effectRef idx="2">
+            <a:schemeClr val="dk1"/>
+          </a:effectRef>
+          <a:fontRef idx="minor">
+            <a:schemeClr val="tx1"/>
+          </a:fontRef>
+        </p:style>
+      </p:cxnSp>
+      <p:cxnSp>
+        <p:nvCxnSpPr>
+          <p:cNvPr id="128" name="Gerade Verbindung mit Pfeil 127">
+            <a:extLst>
+              <a:ext uri="{FF2B5EF4-FFF2-40B4-BE49-F238E27FC236}">
+                <a16:creationId xmlns:a16="http://schemas.microsoft.com/office/drawing/2014/main" id="{278C38A9-9056-8AC8-B90F-938F7DA4FB02}"/>
+              </a:ext>
+            </a:extLst>
+          </p:cNvPr>
+          <p:cNvCxnSpPr>
+            <a:cxnSpLocks/>
+          </p:cNvCxnSpPr>
+          <p:nvPr/>
+        </p:nvCxnSpPr>
+        <p:spPr>
+          <a:xfrm>
+            <a:off x="3496384" y="780763"/>
+            <a:ext cx="2234993" cy="1"/>
+          </a:xfrm>
+          <a:prstGeom prst="straightConnector1">
+            <a:avLst/>
+          </a:prstGeom>
+          <a:ln>
+            <a:tailEnd type="triangle"/>
+          </a:ln>
+        </p:spPr>
+        <p:style>
+          <a:lnRef idx="3">
+            <a:schemeClr val="dk1"/>
+          </a:lnRef>
+          <a:fillRef idx="0">
+            <a:schemeClr val="dk1"/>
+          </a:fillRef>
+          <a:effectRef idx="2">
+            <a:schemeClr val="dk1"/>
+          </a:effectRef>
+          <a:fontRef idx="minor">
+            <a:schemeClr val="tx1"/>
+          </a:fontRef>
+        </p:style>
+      </p:cxnSp>
+      <p:sp>
+        <p:nvSpPr>
+          <p:cNvPr id="129" name="Textfeld 128">
+            <a:extLst>
+              <a:ext uri="{FF2B5EF4-FFF2-40B4-BE49-F238E27FC236}">
+                <a16:creationId xmlns:a16="http://schemas.microsoft.com/office/drawing/2014/main" id="{4D8B7F02-1B22-FDF8-465D-DF77A4C39CF6}"/>
+              </a:ext>
+            </a:extLst>
+          </p:cNvPr>
+          <p:cNvSpPr txBox="1"/>
+          <p:nvPr/>
+        </p:nvSpPr>
+        <p:spPr>
+          <a:xfrm>
+            <a:off x="3594926" y="463454"/>
+            <a:ext cx="2207993" cy="261610"/>
+          </a:xfrm>
+          <a:prstGeom prst="rect">
+            <a:avLst/>
+          </a:prstGeom>
+          <a:noFill/>
+        </p:spPr>
+        <p:txBody>
+          <a:bodyPr wrap="square" rtlCol="0">
+            <a:spAutoFit/>
+          </a:bodyPr>
+          <a:lstStyle/>
+          <a:p>
+            <a:r>
+              <a:rPr lang="de-DE" sz="1100" dirty="0"/>
+              <a:t>pull </a:t>
+            </a:r>
+            <a:r>
+              <a:rPr lang="de-DE" sz="1100" dirty="0" err="1"/>
+              <a:t>request</a:t>
+            </a:r>
+            <a:r>
+              <a:rPr lang="de-DE" sz="1100" dirty="0"/>
+              <a:t> (</a:t>
+            </a:r>
+            <a:r>
+              <a:rPr lang="de-DE" sz="1100" dirty="0" err="1"/>
+              <a:t>master</a:t>
+            </a:r>
+            <a:r>
+              <a:rPr lang="de-DE" sz="1100" dirty="0"/>
+              <a:t> </a:t>
+            </a:r>
+            <a:r>
+              <a:rPr lang="de-DE" sz="1100" dirty="0" err="1"/>
+              <a:t>into</a:t>
+            </a:r>
+            <a:r>
+              <a:rPr lang="de-DE" sz="1100" dirty="0"/>
+              <a:t> </a:t>
+            </a:r>
+            <a:r>
+              <a:rPr lang="de-DE" sz="1100" dirty="0" err="1"/>
+              <a:t>master</a:t>
+            </a:r>
+            <a:r>
+              <a:rPr lang="de-DE" sz="1100" dirty="0"/>
+              <a:t>)</a:t>
+            </a:r>
+          </a:p>
+        </p:txBody>
+      </p:sp>
+      <p:cxnSp>
+        <p:nvCxnSpPr>
+          <p:cNvPr id="130" name="Gerade Verbindung mit Pfeil 129">
+            <a:extLst>
+              <a:ext uri="{FF2B5EF4-FFF2-40B4-BE49-F238E27FC236}">
+                <a16:creationId xmlns:a16="http://schemas.microsoft.com/office/drawing/2014/main" id="{25A58AFF-3BCF-EEDD-DA6B-D73E07EB75B9}"/>
+              </a:ext>
+            </a:extLst>
+          </p:cNvPr>
+          <p:cNvCxnSpPr>
+            <a:cxnSpLocks/>
+          </p:cNvCxnSpPr>
+          <p:nvPr/>
+        </p:nvCxnSpPr>
+        <p:spPr>
+          <a:xfrm flipV="1">
+            <a:off x="5707052" y="967661"/>
+            <a:ext cx="0" cy="1108742"/>
+          </a:xfrm>
+          <a:prstGeom prst="straightConnector1">
+            <a:avLst/>
+          </a:prstGeom>
+          <a:ln>
+            <a:solidFill>
+              <a:schemeClr val="bg1">
+                <a:lumMod val="50000"/>
+              </a:schemeClr>
+            </a:solidFill>
+            <a:tailEnd type="triangle"/>
+          </a:ln>
+        </p:spPr>
+        <p:style>
+          <a:lnRef idx="3">
+            <a:schemeClr val="dk1"/>
+          </a:lnRef>
+          <a:fillRef idx="0">
+            <a:schemeClr val="dk1"/>
+          </a:fillRef>
+          <a:effectRef idx="2">
+            <a:schemeClr val="dk1"/>
+          </a:effectRef>
+          <a:fontRef idx="minor">
+            <a:schemeClr val="tx1"/>
+          </a:fontRef>
+        </p:style>
+      </p:cxnSp>
+      <p:sp>
+        <p:nvSpPr>
+          <p:cNvPr id="33" name="Textfeld 32">
+            <a:extLst>
+              <a:ext uri="{FF2B5EF4-FFF2-40B4-BE49-F238E27FC236}">
+                <a16:creationId xmlns:a16="http://schemas.microsoft.com/office/drawing/2014/main" id="{5243FE8E-5136-60B6-F3BE-8ABCB65282C0}"/>
+              </a:ext>
+            </a:extLst>
+          </p:cNvPr>
+          <p:cNvSpPr txBox="1"/>
+          <p:nvPr/>
+        </p:nvSpPr>
+        <p:spPr>
+          <a:xfrm>
+            <a:off x="7392838" y="792470"/>
+            <a:ext cx="4600753" cy="8125301"/>
+          </a:xfrm>
+          <a:prstGeom prst="rect">
+            <a:avLst/>
+          </a:prstGeom>
+          <a:noFill/>
+        </p:spPr>
+        <p:txBody>
+          <a:bodyPr wrap="square" rtlCol="0">
+            <a:spAutoFit/>
+          </a:bodyPr>
+          <a:lstStyle/>
+          <a:p>
+            <a:pPr marL="342900" indent="-342900">
+              <a:buAutoNum type="arabicPeriod"/>
+            </a:pPr>
+            <a:r>
+              <a:rPr lang="de-DE" dirty="0"/>
+              <a:t>Fork </a:t>
+            </a:r>
+            <a:r>
+              <a:rPr lang="de-DE" dirty="0" err="1"/>
+              <a:t>the</a:t>
+            </a:r>
+            <a:r>
+              <a:rPr lang="de-DE" dirty="0"/>
+              <a:t> buschlab-</a:t>
+            </a:r>
+            <a:r>
+              <a:rPr lang="de-DE" dirty="0" err="1"/>
+              <a:t>eeg</a:t>
+            </a:r>
+            <a:r>
+              <a:rPr lang="de-DE" dirty="0"/>
+              <a:t>-pipeline </a:t>
+            </a:r>
+            <a:r>
+              <a:rPr lang="de-DE" dirty="0" err="1"/>
+              <a:t>repository</a:t>
+            </a:r>
+            <a:r>
+              <a:rPr lang="de-DE" dirty="0"/>
+              <a:t>. </a:t>
+            </a:r>
+            <a:r>
+              <a:rPr lang="de-DE" dirty="0" err="1"/>
+              <a:t>Your</a:t>
+            </a:r>
+            <a:r>
+              <a:rPr lang="de-DE" dirty="0"/>
+              <a:t> </a:t>
+            </a:r>
+            <a:r>
+              <a:rPr lang="de-DE" dirty="0" err="1"/>
+              <a:t>forked</a:t>
+            </a:r>
+            <a:r>
+              <a:rPr lang="de-DE" dirty="0"/>
+              <a:t> </a:t>
+            </a:r>
+            <a:r>
+              <a:rPr lang="de-DE" dirty="0" err="1"/>
+              <a:t>repository</a:t>
+            </a:r>
+            <a:r>
+              <a:rPr lang="de-DE" dirty="0"/>
+              <a:t> will </a:t>
+            </a:r>
+            <a:r>
+              <a:rPr lang="de-DE" dirty="0" err="1"/>
+              <a:t>serve</a:t>
+            </a:r>
+            <a:r>
+              <a:rPr lang="de-DE" dirty="0"/>
+              <a:t> </a:t>
+            </a:r>
+            <a:r>
+              <a:rPr lang="de-DE" dirty="0" err="1"/>
+              <a:t>as</a:t>
+            </a:r>
+            <a:r>
+              <a:rPr lang="de-DE" dirty="0"/>
+              <a:t> a </a:t>
+            </a:r>
+            <a:r>
+              <a:rPr lang="de-DE" dirty="0" err="1"/>
+              <a:t>single</a:t>
+            </a:r>
+            <a:r>
+              <a:rPr lang="de-DE" dirty="0"/>
+              <a:t> </a:t>
+            </a:r>
+            <a:r>
+              <a:rPr lang="de-DE" dirty="0" err="1"/>
+              <a:t>repo</a:t>
+            </a:r>
+            <a:r>
+              <a:rPr lang="de-DE" dirty="0"/>
+              <a:t> </a:t>
+            </a:r>
+            <a:r>
+              <a:rPr lang="de-DE" dirty="0" err="1"/>
+              <a:t>organizing</a:t>
+            </a:r>
+            <a:r>
+              <a:rPr lang="de-DE" dirty="0"/>
+              <a:t> all </a:t>
+            </a:r>
+            <a:r>
+              <a:rPr lang="de-DE" dirty="0" err="1"/>
+              <a:t>your</a:t>
+            </a:r>
+            <a:r>
+              <a:rPr lang="de-DE" dirty="0"/>
+              <a:t> different </a:t>
+            </a:r>
+            <a:r>
+              <a:rPr lang="de-DE" dirty="0" err="1"/>
+              <a:t>projects</a:t>
+            </a:r>
+            <a:r>
+              <a:rPr lang="de-DE" dirty="0"/>
+              <a:t>‘ </a:t>
+            </a:r>
+            <a:r>
+              <a:rPr lang="de-DE" dirty="0" err="1"/>
+              <a:t>preprocessing</a:t>
+            </a:r>
+            <a:r>
+              <a:rPr lang="de-DE" dirty="0"/>
+              <a:t> </a:t>
+            </a:r>
+            <a:r>
+              <a:rPr lang="de-DE" dirty="0" err="1"/>
+              <a:t>pipelines</a:t>
+            </a:r>
+            <a:endParaRPr lang="de-DE" dirty="0"/>
+          </a:p>
+          <a:p>
+            <a:pPr marL="342900" indent="-342900">
+              <a:buAutoNum type="arabicPeriod"/>
+            </a:pPr>
+            <a:r>
+              <a:rPr lang="de-DE" dirty="0"/>
+              <a:t>Keep </a:t>
+            </a:r>
+            <a:r>
+              <a:rPr lang="de-DE" dirty="0" err="1"/>
+              <a:t>the</a:t>
+            </a:r>
+            <a:r>
+              <a:rPr lang="de-DE" dirty="0"/>
+              <a:t> </a:t>
+            </a:r>
+            <a:r>
+              <a:rPr lang="de-DE" dirty="0" err="1"/>
+              <a:t>master</a:t>
+            </a:r>
+            <a:r>
+              <a:rPr lang="de-DE" dirty="0"/>
+              <a:t> </a:t>
+            </a:r>
+            <a:r>
+              <a:rPr lang="de-DE" dirty="0" err="1"/>
+              <a:t>branch</a:t>
+            </a:r>
+            <a:r>
+              <a:rPr lang="de-DE" dirty="0"/>
+              <a:t> </a:t>
+            </a:r>
+            <a:r>
+              <a:rPr lang="de-DE" dirty="0" err="1"/>
+              <a:t>as</a:t>
+            </a:r>
+            <a:r>
+              <a:rPr lang="de-DE" dirty="0"/>
+              <a:t> </a:t>
+            </a:r>
+            <a:r>
+              <a:rPr lang="de-DE" dirty="0" err="1"/>
+              <a:t>your</a:t>
+            </a:r>
+            <a:r>
+              <a:rPr lang="de-DE" dirty="0"/>
+              <a:t> </a:t>
+            </a:r>
+            <a:r>
+              <a:rPr lang="de-DE" dirty="0" err="1"/>
+              <a:t>default</a:t>
+            </a:r>
+            <a:r>
+              <a:rPr lang="de-DE" dirty="0"/>
+              <a:t>, </a:t>
+            </a:r>
+            <a:r>
+              <a:rPr lang="de-DE" dirty="0" err="1"/>
+              <a:t>which</a:t>
+            </a:r>
+            <a:r>
+              <a:rPr lang="de-DE" dirty="0"/>
+              <a:t> </a:t>
+            </a:r>
+            <a:r>
+              <a:rPr lang="de-DE" dirty="0" err="1"/>
+              <a:t>you</a:t>
+            </a:r>
+            <a:r>
+              <a:rPr lang="de-DE" dirty="0"/>
+              <a:t> will </a:t>
+            </a:r>
+            <a:r>
+              <a:rPr lang="de-DE" dirty="0" err="1"/>
+              <a:t>only</a:t>
+            </a:r>
+            <a:r>
+              <a:rPr lang="de-DE" dirty="0"/>
+              <a:t> update </a:t>
+            </a:r>
+            <a:r>
+              <a:rPr lang="de-DE" dirty="0" err="1"/>
+              <a:t>with</a:t>
+            </a:r>
+            <a:r>
+              <a:rPr lang="de-DE" dirty="0"/>
+              <a:t> (1) </a:t>
+            </a:r>
+            <a:r>
+              <a:rPr lang="de-DE" dirty="0" err="1"/>
+              <a:t>features</a:t>
+            </a:r>
+            <a:r>
+              <a:rPr lang="de-DE" dirty="0"/>
+              <a:t> </a:t>
+            </a:r>
+            <a:r>
+              <a:rPr lang="de-DE" dirty="0" err="1"/>
+              <a:t>you</a:t>
+            </a:r>
+            <a:r>
+              <a:rPr lang="de-DE" dirty="0"/>
+              <a:t> </a:t>
+            </a:r>
+            <a:r>
+              <a:rPr lang="de-DE" dirty="0" err="1"/>
+              <a:t>want</a:t>
+            </a:r>
+            <a:r>
+              <a:rPr lang="de-DE" dirty="0"/>
+              <a:t> </a:t>
+            </a:r>
+            <a:r>
+              <a:rPr lang="de-DE" dirty="0" err="1"/>
+              <a:t>to</a:t>
+            </a:r>
+            <a:r>
+              <a:rPr lang="de-DE" dirty="0"/>
+              <a:t> send </a:t>
+            </a:r>
+            <a:r>
+              <a:rPr lang="de-DE" dirty="0" err="1"/>
+              <a:t>as</a:t>
+            </a:r>
+            <a:r>
+              <a:rPr lang="de-DE" dirty="0"/>
+              <a:t> pull </a:t>
+            </a:r>
+            <a:r>
+              <a:rPr lang="de-DE" dirty="0" err="1"/>
+              <a:t>requests</a:t>
+            </a:r>
+            <a:r>
+              <a:rPr lang="de-DE" dirty="0"/>
+              <a:t> </a:t>
+            </a:r>
+            <a:r>
+              <a:rPr lang="de-DE" dirty="0" err="1"/>
+              <a:t>to</a:t>
+            </a:r>
+            <a:r>
+              <a:rPr lang="de-DE" dirty="0"/>
+              <a:t> </a:t>
+            </a:r>
+            <a:r>
+              <a:rPr lang="de-DE" dirty="0" err="1"/>
+              <a:t>the</a:t>
+            </a:r>
+            <a:r>
+              <a:rPr lang="de-DE" dirty="0"/>
+              <a:t> </a:t>
+            </a:r>
+            <a:r>
+              <a:rPr lang="de-DE" dirty="0" err="1"/>
+              <a:t>buschlab</a:t>
+            </a:r>
+            <a:r>
+              <a:rPr lang="de-DE" dirty="0"/>
+              <a:t> </a:t>
+            </a:r>
+            <a:r>
+              <a:rPr lang="de-DE" dirty="0" err="1"/>
+              <a:t>repository</a:t>
+            </a:r>
+            <a:r>
+              <a:rPr lang="de-DE" dirty="0"/>
+              <a:t>, </a:t>
+            </a:r>
+            <a:r>
+              <a:rPr lang="de-DE" dirty="0" err="1"/>
+              <a:t>or</a:t>
+            </a:r>
+            <a:r>
+              <a:rPr lang="de-DE" dirty="0"/>
+              <a:t> (2) </a:t>
+            </a:r>
+            <a:r>
+              <a:rPr lang="de-DE" dirty="0" err="1"/>
+              <a:t>by</a:t>
+            </a:r>
+            <a:r>
+              <a:rPr lang="de-DE" dirty="0"/>
+              <a:t> </a:t>
+            </a:r>
+            <a:r>
+              <a:rPr lang="de-DE" dirty="0" err="1"/>
+              <a:t>merging</a:t>
+            </a:r>
+            <a:r>
+              <a:rPr lang="de-DE" dirty="0"/>
+              <a:t> </a:t>
+            </a:r>
+            <a:r>
+              <a:rPr lang="de-DE" dirty="0" err="1"/>
+              <a:t>updates</a:t>
+            </a:r>
+            <a:r>
+              <a:rPr lang="de-DE" dirty="0"/>
+              <a:t> </a:t>
+            </a:r>
+            <a:r>
+              <a:rPr lang="de-DE" dirty="0" err="1"/>
+              <a:t>from</a:t>
+            </a:r>
+            <a:r>
+              <a:rPr lang="de-DE" dirty="0"/>
+              <a:t> </a:t>
+            </a:r>
+            <a:r>
+              <a:rPr lang="de-DE" dirty="0" err="1"/>
+              <a:t>the</a:t>
+            </a:r>
+            <a:r>
+              <a:rPr lang="de-DE" dirty="0"/>
+              <a:t> </a:t>
+            </a:r>
+            <a:r>
+              <a:rPr lang="de-DE" dirty="0" err="1"/>
+              <a:t>buschlab</a:t>
+            </a:r>
+            <a:r>
+              <a:rPr lang="de-DE" dirty="0"/>
+              <a:t> </a:t>
+            </a:r>
+            <a:r>
+              <a:rPr lang="de-DE" dirty="0" err="1"/>
+              <a:t>repo</a:t>
+            </a:r>
+            <a:r>
+              <a:rPr lang="de-DE" dirty="0"/>
+              <a:t> </a:t>
+            </a:r>
+            <a:r>
+              <a:rPr lang="de-DE" dirty="0" err="1"/>
+              <a:t>into</a:t>
+            </a:r>
+            <a:r>
+              <a:rPr lang="de-DE" dirty="0"/>
+              <a:t> </a:t>
+            </a:r>
+            <a:r>
+              <a:rPr lang="de-DE" dirty="0" err="1"/>
+              <a:t>your</a:t>
+            </a:r>
+            <a:r>
+              <a:rPr lang="de-DE" dirty="0"/>
+              <a:t> </a:t>
+            </a:r>
+            <a:r>
+              <a:rPr lang="de-DE" dirty="0" err="1"/>
+              <a:t>master</a:t>
+            </a:r>
+            <a:r>
+              <a:rPr lang="de-DE" dirty="0"/>
+              <a:t> </a:t>
+            </a:r>
+            <a:r>
+              <a:rPr lang="de-DE" dirty="0" err="1"/>
+              <a:t>branch</a:t>
+            </a:r>
+            <a:r>
+              <a:rPr lang="de-DE" dirty="0"/>
+              <a:t> (and </a:t>
+            </a:r>
+            <a:r>
+              <a:rPr lang="de-DE" dirty="0" err="1"/>
+              <a:t>from</a:t>
+            </a:r>
+            <a:r>
+              <a:rPr lang="de-DE" dirty="0"/>
+              <a:t> </a:t>
+            </a:r>
+            <a:r>
+              <a:rPr lang="de-DE" dirty="0" err="1"/>
+              <a:t>here</a:t>
+            </a:r>
+            <a:r>
+              <a:rPr lang="de-DE" dirty="0"/>
+              <a:t>, </a:t>
+            </a:r>
+            <a:r>
+              <a:rPr lang="de-DE" dirty="0" err="1"/>
+              <a:t>you</a:t>
+            </a:r>
+            <a:r>
+              <a:rPr lang="de-DE" dirty="0"/>
+              <a:t> </a:t>
+            </a:r>
+            <a:r>
+              <a:rPr lang="de-DE" dirty="0" err="1"/>
+              <a:t>can</a:t>
+            </a:r>
+            <a:r>
+              <a:rPr lang="de-DE" dirty="0"/>
+              <a:t> </a:t>
+            </a:r>
+            <a:r>
+              <a:rPr lang="de-DE" dirty="0" err="1"/>
+              <a:t>merge</a:t>
+            </a:r>
+            <a:r>
+              <a:rPr lang="de-DE" dirty="0"/>
+              <a:t> </a:t>
+            </a:r>
+            <a:r>
+              <a:rPr lang="de-DE" dirty="0" err="1"/>
+              <a:t>the</a:t>
+            </a:r>
+            <a:r>
+              <a:rPr lang="de-DE" dirty="0"/>
+              <a:t> </a:t>
+            </a:r>
+            <a:r>
+              <a:rPr lang="de-DE" dirty="0" err="1"/>
+              <a:t>updates</a:t>
+            </a:r>
+            <a:r>
+              <a:rPr lang="de-DE" dirty="0"/>
+              <a:t> </a:t>
+            </a:r>
+            <a:r>
+              <a:rPr lang="de-DE" dirty="0" err="1"/>
+              <a:t>into</a:t>
+            </a:r>
+            <a:r>
+              <a:rPr lang="de-DE" dirty="0"/>
+              <a:t> </a:t>
+            </a:r>
+            <a:r>
+              <a:rPr lang="de-DE" dirty="0" err="1"/>
+              <a:t>your</a:t>
+            </a:r>
+            <a:r>
+              <a:rPr lang="de-DE" dirty="0"/>
+              <a:t> </a:t>
+            </a:r>
+            <a:r>
+              <a:rPr lang="de-DE" dirty="0" err="1"/>
+              <a:t>projects</a:t>
+            </a:r>
+            <a:r>
+              <a:rPr lang="de-DE" dirty="0"/>
+              <a:t>‘ </a:t>
+            </a:r>
+            <a:r>
+              <a:rPr lang="de-DE" dirty="0" err="1"/>
+              <a:t>branches</a:t>
+            </a:r>
+            <a:r>
+              <a:rPr lang="de-DE" dirty="0"/>
+              <a:t> </a:t>
+            </a:r>
+            <a:r>
+              <a:rPr lang="de-DE" dirty="0" err="1"/>
+              <a:t>if</a:t>
+            </a:r>
+            <a:r>
+              <a:rPr lang="de-DE" dirty="0"/>
+              <a:t> </a:t>
+            </a:r>
+            <a:r>
+              <a:rPr lang="de-DE" dirty="0" err="1"/>
+              <a:t>needed</a:t>
+            </a:r>
+            <a:r>
+              <a:rPr lang="de-DE" dirty="0"/>
+              <a:t>)</a:t>
+            </a:r>
+          </a:p>
+          <a:p>
+            <a:pPr marL="342900" indent="-342900">
+              <a:buAutoNum type="arabicPeriod"/>
+            </a:pPr>
+            <a:r>
+              <a:rPr lang="de-DE" dirty="0" err="1"/>
+              <a:t>You</a:t>
+            </a:r>
+            <a:r>
+              <a:rPr lang="de-DE" dirty="0"/>
+              <a:t> will </a:t>
+            </a:r>
+            <a:r>
+              <a:rPr lang="de-DE" dirty="0" err="1"/>
+              <a:t>work</a:t>
+            </a:r>
+            <a:r>
+              <a:rPr lang="de-DE" dirty="0"/>
+              <a:t> in </a:t>
+            </a:r>
+            <a:r>
+              <a:rPr lang="de-DE" dirty="0" err="1"/>
+              <a:t>your</a:t>
+            </a:r>
+            <a:r>
+              <a:rPr lang="de-DE" dirty="0"/>
+              <a:t> </a:t>
+            </a:r>
+            <a:r>
+              <a:rPr lang="de-DE" dirty="0" err="1"/>
+              <a:t>respective</a:t>
+            </a:r>
+            <a:r>
+              <a:rPr lang="de-DE" dirty="0"/>
+              <a:t> </a:t>
+            </a:r>
+            <a:r>
+              <a:rPr lang="de-DE" dirty="0" err="1"/>
+              <a:t>project‘s</a:t>
+            </a:r>
+            <a:r>
+              <a:rPr lang="de-DE" dirty="0"/>
+              <a:t> </a:t>
+            </a:r>
+            <a:r>
+              <a:rPr lang="de-DE" dirty="0" err="1"/>
+              <a:t>branch</a:t>
+            </a:r>
+            <a:r>
+              <a:rPr lang="de-DE" dirty="0"/>
+              <a:t>, and </a:t>
+            </a:r>
+            <a:r>
+              <a:rPr lang="de-DE" dirty="0" err="1"/>
+              <a:t>whenever</a:t>
+            </a:r>
+            <a:r>
+              <a:rPr lang="de-DE" dirty="0"/>
+              <a:t> </a:t>
+            </a:r>
+            <a:r>
+              <a:rPr lang="de-DE" dirty="0" err="1"/>
+              <a:t>you</a:t>
+            </a:r>
+            <a:r>
+              <a:rPr lang="de-DE" dirty="0"/>
+              <a:t> </a:t>
+            </a:r>
+            <a:r>
+              <a:rPr lang="de-DE" dirty="0" err="1"/>
+              <a:t>have</a:t>
+            </a:r>
+            <a:r>
+              <a:rPr lang="de-DE" dirty="0"/>
+              <a:t> </a:t>
+            </a:r>
+            <a:r>
+              <a:rPr lang="de-DE" dirty="0" err="1"/>
+              <a:t>committed</a:t>
+            </a:r>
+            <a:r>
+              <a:rPr lang="de-DE" dirty="0"/>
+              <a:t> a </a:t>
+            </a:r>
+            <a:r>
+              <a:rPr lang="de-DE" dirty="0" err="1"/>
+              <a:t>meaningful</a:t>
+            </a:r>
+            <a:r>
+              <a:rPr lang="de-DE" dirty="0"/>
+              <a:t> feature </a:t>
+            </a:r>
+            <a:r>
+              <a:rPr lang="de-DE" dirty="0" err="1"/>
+              <a:t>for</a:t>
+            </a:r>
+            <a:r>
+              <a:rPr lang="de-DE" dirty="0"/>
+              <a:t> </a:t>
+            </a:r>
+            <a:r>
+              <a:rPr lang="de-DE" dirty="0" err="1"/>
+              <a:t>the</a:t>
+            </a:r>
+            <a:r>
+              <a:rPr lang="de-DE" dirty="0"/>
+              <a:t> </a:t>
+            </a:r>
+            <a:r>
+              <a:rPr lang="de-DE" dirty="0" err="1"/>
+              <a:t>pipeline</a:t>
+            </a:r>
+            <a:r>
+              <a:rPr lang="de-DE" dirty="0"/>
+              <a:t>, </a:t>
+            </a:r>
+            <a:r>
+              <a:rPr lang="de-DE" dirty="0" err="1"/>
+              <a:t>you</a:t>
+            </a:r>
+            <a:r>
+              <a:rPr lang="de-DE" dirty="0"/>
+              <a:t> </a:t>
+            </a:r>
+            <a:r>
+              <a:rPr lang="de-DE" dirty="0" err="1"/>
+              <a:t>afterwards</a:t>
+            </a:r>
+            <a:r>
+              <a:rPr lang="de-DE" dirty="0"/>
+              <a:t> switch </a:t>
+            </a:r>
+            <a:r>
+              <a:rPr lang="de-DE" dirty="0" err="1"/>
+              <a:t>to</a:t>
+            </a:r>
+            <a:r>
+              <a:rPr lang="de-DE" dirty="0"/>
+              <a:t> </a:t>
+            </a:r>
+            <a:r>
+              <a:rPr lang="de-DE" dirty="0" err="1"/>
+              <a:t>the</a:t>
+            </a:r>
+            <a:r>
+              <a:rPr lang="de-DE" dirty="0"/>
+              <a:t> </a:t>
+            </a:r>
+            <a:r>
+              <a:rPr lang="de-DE" dirty="0" err="1"/>
+              <a:t>master</a:t>
+            </a:r>
+            <a:r>
+              <a:rPr lang="de-DE" dirty="0"/>
+              <a:t> </a:t>
+            </a:r>
+            <a:r>
+              <a:rPr lang="de-DE" dirty="0" err="1"/>
+              <a:t>branch</a:t>
+            </a:r>
+            <a:r>
+              <a:rPr lang="de-DE" dirty="0"/>
+              <a:t> and </a:t>
+            </a:r>
+            <a:r>
+              <a:rPr lang="de-DE" dirty="0" err="1"/>
+              <a:t>cherry</a:t>
+            </a:r>
+            <a:r>
+              <a:rPr lang="de-DE" dirty="0"/>
+              <a:t>-pick </a:t>
+            </a:r>
+            <a:r>
+              <a:rPr lang="de-DE" dirty="0" err="1"/>
+              <a:t>the</a:t>
+            </a:r>
+            <a:r>
+              <a:rPr lang="de-DE" dirty="0"/>
+              <a:t> </a:t>
+            </a:r>
+            <a:r>
+              <a:rPr lang="de-DE" dirty="0" err="1"/>
+              <a:t>commit</a:t>
+            </a:r>
+            <a:r>
+              <a:rPr lang="de-DE" dirty="0"/>
+              <a:t> </a:t>
+            </a:r>
+            <a:r>
+              <a:rPr lang="de-DE" dirty="0" err="1"/>
+              <a:t>of</a:t>
+            </a:r>
+            <a:r>
+              <a:rPr lang="de-DE" dirty="0"/>
+              <a:t> </a:t>
+            </a:r>
+            <a:r>
+              <a:rPr lang="de-DE" dirty="0" err="1"/>
+              <a:t>interest</a:t>
+            </a:r>
+            <a:r>
+              <a:rPr lang="de-DE" dirty="0"/>
+              <a:t> </a:t>
+            </a:r>
+            <a:r>
+              <a:rPr lang="de-DE" dirty="0" err="1"/>
+              <a:t>to</a:t>
+            </a:r>
+            <a:r>
+              <a:rPr lang="de-DE" dirty="0"/>
+              <a:t> </a:t>
+            </a:r>
+            <a:r>
+              <a:rPr lang="de-DE" dirty="0" err="1"/>
+              <a:t>incorporate</a:t>
+            </a:r>
+            <a:r>
+              <a:rPr lang="de-DE" dirty="0"/>
+              <a:t> </a:t>
+            </a:r>
+            <a:r>
+              <a:rPr lang="de-DE" dirty="0" err="1"/>
+              <a:t>it</a:t>
+            </a:r>
+            <a:r>
+              <a:rPr lang="de-DE" dirty="0"/>
+              <a:t> </a:t>
+            </a:r>
+            <a:r>
+              <a:rPr lang="de-DE" dirty="0" err="1"/>
+              <a:t>into</a:t>
+            </a:r>
+            <a:r>
+              <a:rPr lang="de-DE" dirty="0"/>
+              <a:t> </a:t>
+            </a:r>
+            <a:r>
+              <a:rPr lang="de-DE" dirty="0" err="1"/>
+              <a:t>the</a:t>
+            </a:r>
+            <a:r>
+              <a:rPr lang="de-DE" dirty="0"/>
+              <a:t> </a:t>
+            </a:r>
+            <a:r>
+              <a:rPr lang="de-DE" dirty="0" err="1"/>
+              <a:t>master</a:t>
+            </a:r>
+            <a:r>
+              <a:rPr lang="de-DE" dirty="0"/>
+              <a:t>. In a final </a:t>
+            </a:r>
+            <a:r>
+              <a:rPr lang="de-DE" dirty="0" err="1"/>
+              <a:t>step</a:t>
+            </a:r>
+            <a:r>
+              <a:rPr lang="de-DE" dirty="0"/>
+              <a:t>, </a:t>
+            </a:r>
+            <a:r>
+              <a:rPr lang="de-DE" dirty="0" err="1"/>
+              <a:t>you</a:t>
+            </a:r>
+            <a:r>
+              <a:rPr lang="de-DE" dirty="0"/>
+              <a:t> send a pull </a:t>
+            </a:r>
+            <a:r>
+              <a:rPr lang="de-DE" dirty="0" err="1"/>
+              <a:t>request</a:t>
+            </a:r>
+            <a:r>
+              <a:rPr lang="de-DE" dirty="0"/>
+              <a:t> </a:t>
+            </a:r>
+            <a:r>
+              <a:rPr lang="de-DE" dirty="0" err="1"/>
+              <a:t>to</a:t>
+            </a:r>
+            <a:r>
+              <a:rPr lang="de-DE" dirty="0"/>
+              <a:t> buschlab-</a:t>
+            </a:r>
+            <a:r>
+              <a:rPr lang="de-DE" dirty="0" err="1"/>
+              <a:t>muenster</a:t>
+            </a:r>
+            <a:r>
+              <a:rPr lang="de-DE" dirty="0"/>
+              <a:t> (</a:t>
+            </a:r>
+            <a:r>
+              <a:rPr lang="de-DE" dirty="0" err="1"/>
+              <a:t>master</a:t>
+            </a:r>
+            <a:r>
+              <a:rPr lang="de-DE" dirty="0"/>
+              <a:t> </a:t>
+            </a:r>
+            <a:r>
+              <a:rPr lang="de-DE" dirty="0" err="1"/>
+              <a:t>to</a:t>
+            </a:r>
+            <a:r>
+              <a:rPr lang="de-DE" dirty="0"/>
+              <a:t> </a:t>
+            </a:r>
+            <a:r>
+              <a:rPr lang="de-DE" dirty="0" err="1"/>
+              <a:t>master</a:t>
+            </a:r>
+            <a:r>
+              <a:rPr lang="de-DE" dirty="0"/>
+              <a:t>) </a:t>
+            </a:r>
+          </a:p>
+          <a:p>
+            <a:pPr marL="342900" indent="-342900">
+              <a:buAutoNum type="arabicPeriod"/>
+            </a:pPr>
+            <a:r>
+              <a:rPr lang="de-DE" dirty="0" err="1"/>
+              <a:t>If</a:t>
+            </a:r>
+            <a:r>
+              <a:rPr lang="de-DE" dirty="0"/>
+              <a:t> </a:t>
+            </a:r>
+            <a:r>
+              <a:rPr lang="de-DE" dirty="0" err="1"/>
+              <a:t>you</a:t>
+            </a:r>
+            <a:r>
+              <a:rPr lang="de-DE" dirty="0"/>
+              <a:t> </a:t>
+            </a:r>
+            <a:r>
+              <a:rPr lang="de-DE" dirty="0" err="1"/>
+              <a:t>want</a:t>
+            </a:r>
+            <a:r>
+              <a:rPr lang="de-DE" dirty="0"/>
+              <a:t> </a:t>
+            </a:r>
+            <a:r>
+              <a:rPr lang="de-DE" dirty="0" err="1"/>
+              <a:t>to</a:t>
+            </a:r>
+            <a:r>
+              <a:rPr lang="de-DE" dirty="0"/>
+              <a:t> „release“ </a:t>
+            </a:r>
+            <a:r>
+              <a:rPr lang="de-DE" dirty="0" err="1"/>
+              <a:t>the</a:t>
+            </a:r>
+            <a:r>
+              <a:rPr lang="de-DE" dirty="0"/>
+              <a:t> final </a:t>
+            </a:r>
+            <a:r>
+              <a:rPr lang="de-DE" dirty="0" err="1"/>
+              <a:t>preprocessing</a:t>
+            </a:r>
+            <a:r>
+              <a:rPr lang="de-DE" dirty="0"/>
+              <a:t> </a:t>
+            </a:r>
+            <a:r>
+              <a:rPr lang="de-DE" dirty="0" err="1"/>
+              <a:t>pipeline</a:t>
+            </a:r>
+            <a:r>
+              <a:rPr lang="de-DE" dirty="0"/>
+              <a:t>, e.g. </a:t>
+            </a:r>
+            <a:r>
+              <a:rPr lang="de-DE" dirty="0" err="1"/>
+              <a:t>for</a:t>
+            </a:r>
+            <a:r>
+              <a:rPr lang="de-DE" dirty="0"/>
+              <a:t> a </a:t>
+            </a:r>
+            <a:r>
+              <a:rPr lang="de-DE" dirty="0" err="1"/>
+              <a:t>publication</a:t>
+            </a:r>
+            <a:r>
+              <a:rPr lang="de-DE" dirty="0"/>
+              <a:t>, </a:t>
+            </a:r>
+            <a:r>
+              <a:rPr lang="de-DE" dirty="0" err="1"/>
+              <a:t>you</a:t>
+            </a:r>
+            <a:r>
+              <a:rPr lang="de-DE" dirty="0"/>
+              <a:t> </a:t>
+            </a:r>
+            <a:r>
+              <a:rPr lang="de-DE" dirty="0" err="1"/>
+              <a:t>could</a:t>
+            </a:r>
+            <a:r>
+              <a:rPr lang="de-DE" dirty="0"/>
+              <a:t> </a:t>
+            </a:r>
+            <a:r>
+              <a:rPr lang="de-DE" dirty="0" err="1"/>
+              <a:t>either</a:t>
+            </a:r>
+            <a:r>
+              <a:rPr lang="de-DE" dirty="0"/>
+              <a:t> </a:t>
+            </a:r>
+            <a:r>
+              <a:rPr lang="de-DE" dirty="0" err="1"/>
+              <a:t>think</a:t>
+            </a:r>
+            <a:r>
+              <a:rPr lang="de-DE" dirty="0"/>
+              <a:t> </a:t>
+            </a:r>
+            <a:r>
+              <a:rPr lang="de-DE" dirty="0" err="1"/>
+              <a:t>about</a:t>
+            </a:r>
+            <a:r>
+              <a:rPr lang="de-DE" dirty="0"/>
+              <a:t> a GitHub release </a:t>
+            </a:r>
+            <a:r>
+              <a:rPr lang="de-DE" dirty="0" err="1"/>
+              <a:t>of</a:t>
+            </a:r>
+            <a:r>
+              <a:rPr lang="de-DE" dirty="0"/>
+              <a:t> </a:t>
+            </a:r>
+            <a:r>
+              <a:rPr lang="de-DE" dirty="0" err="1"/>
+              <a:t>the</a:t>
+            </a:r>
+            <a:r>
+              <a:rPr lang="de-DE" dirty="0"/>
+              <a:t> </a:t>
+            </a:r>
+            <a:r>
+              <a:rPr lang="de-DE" dirty="0" err="1"/>
+              <a:t>respective</a:t>
+            </a:r>
+            <a:r>
+              <a:rPr lang="de-DE" dirty="0"/>
+              <a:t> </a:t>
+            </a:r>
+            <a:r>
+              <a:rPr lang="de-DE" dirty="0" err="1"/>
+              <a:t>branch</a:t>
+            </a:r>
+            <a:r>
+              <a:rPr lang="de-DE" dirty="0"/>
+              <a:t> (</a:t>
+            </a:r>
+            <a:r>
+              <a:rPr lang="de-DE" dirty="0" err="1"/>
+              <a:t>see</a:t>
+            </a:r>
+            <a:r>
+              <a:rPr lang="de-DE" dirty="0"/>
+              <a:t> </a:t>
+            </a:r>
+            <a:r>
+              <a:rPr lang="de-DE" dirty="0">
+                <a:hlinkClick r:id="rId2"/>
+              </a:rPr>
+              <a:t>https://docs.github.com/en/repositories/releasing-projects-on-github/managing-releases-in-a-repository</a:t>
+            </a:r>
+            <a:r>
+              <a:rPr lang="de-DE" dirty="0"/>
+              <a:t>) </a:t>
+            </a:r>
+            <a:r>
+              <a:rPr lang="de-DE" dirty="0" err="1"/>
+              <a:t>or</a:t>
+            </a:r>
+            <a:r>
+              <a:rPr lang="de-DE" dirty="0"/>
+              <a:t> </a:t>
+            </a:r>
+            <a:r>
+              <a:rPr lang="de-DE" dirty="0" err="1"/>
+              <a:t>paste</a:t>
+            </a:r>
+            <a:r>
+              <a:rPr lang="de-DE" dirty="0"/>
+              <a:t> </a:t>
+            </a:r>
+            <a:r>
+              <a:rPr lang="de-DE" dirty="0" err="1"/>
+              <a:t>the</a:t>
+            </a:r>
+            <a:r>
+              <a:rPr lang="de-DE" dirty="0"/>
+              <a:t> final </a:t>
+            </a:r>
+            <a:r>
+              <a:rPr lang="de-DE" dirty="0" err="1"/>
+              <a:t>version</a:t>
+            </a:r>
+            <a:r>
+              <a:rPr lang="de-DE" dirty="0"/>
+              <a:t> </a:t>
+            </a:r>
+            <a:r>
+              <a:rPr lang="de-DE" dirty="0" err="1"/>
+              <a:t>into</a:t>
+            </a:r>
+            <a:r>
+              <a:rPr lang="de-DE" dirty="0"/>
+              <a:t> a </a:t>
+            </a:r>
+            <a:r>
+              <a:rPr lang="de-DE" dirty="0" err="1"/>
+              <a:t>new</a:t>
+            </a:r>
+            <a:r>
+              <a:rPr lang="de-DE" dirty="0"/>
+              <a:t> stand-</a:t>
+            </a:r>
+            <a:r>
+              <a:rPr lang="de-DE" dirty="0" err="1"/>
+              <a:t>alone</a:t>
+            </a:r>
+            <a:r>
+              <a:rPr lang="de-DE" dirty="0"/>
+              <a:t> </a:t>
+            </a:r>
+            <a:r>
+              <a:rPr lang="de-DE" dirty="0" err="1"/>
+              <a:t>repository</a:t>
+            </a:r>
+            <a:endParaRPr lang="de-DE" dirty="0"/>
+          </a:p>
+        </p:txBody>
+      </p:sp>
     </p:spTree>
     <p:extLst>
       <p:ext uri="{BB962C8B-B14F-4D97-AF65-F5344CB8AC3E}">
-        <p14:creationId xmlns:p14="http://schemas.microsoft.com/office/powerpoint/2010/main" val="2502894247"/>
+        <p14:creationId xmlns:p14="http://schemas.microsoft.com/office/powerpoint/2010/main" val="1444364364"/>
       </p:ext>
     </p:extLst>
   </p:cSld>
   <p:clrMapOvr>
     <a:masterClrMapping/>
   </p:clrMapOvr>
+  <p:timing>
+    <p:tnLst>
+      <p:par>
+        <p:cTn id="1" dur="indefinite" restart="never" nodeType="tmRoot">
+          <p:childTnLst>
+            <p:seq concurrent="1" nextAc="seek">
+              <p:cTn id="2" dur="indefinite" nodeType="mainSeq">
+                <p:childTnLst>
+                  <p:par>
+                    <p:cTn id="3" fill="hold">
+                      <p:stCondLst>
+                        <p:cond delay="indefinite"/>
+                      </p:stCondLst>
+                      <p:childTnLst>
+                        <p:par>
+                          <p:cTn id="4" fill="hold">
+                            <p:stCondLst>
+                              <p:cond delay="0"/>
+                            </p:stCondLst>
+                            <p:childTnLst>
+                              <p:par>
+                                <p:cTn id="5" presetID="1" presetClass="entr" presetSubtype="0" fill="hold" nodeType="clickEffect">
+                                  <p:stCondLst>
+                                    <p:cond delay="0"/>
+                                  </p:stCondLst>
+                                  <p:childTnLst>
+                                    <p:set>
+                                      <p:cBhvr>
+                                        <p:cTn id="6" dur="1" fill="hold">
+                                          <p:stCondLst>
+                                            <p:cond delay="0"/>
+                                          </p:stCondLst>
+                                        </p:cTn>
+                                        <p:tgtEl>
+                                          <p:spTgt spid="89"/>
+                                        </p:tgtEl>
+                                        <p:attrNameLst>
+                                          <p:attrName>style.visibility</p:attrName>
+                                        </p:attrNameLst>
+                                      </p:cBhvr>
+                                      <p:to>
+                                        <p:strVal val="visible"/>
+                                      </p:to>
+                                    </p:set>
+                                  </p:childTnLst>
+                                </p:cTn>
+                              </p:par>
+                            </p:childTnLst>
+                          </p:cTn>
+                        </p:par>
+                      </p:childTnLst>
+                    </p:cTn>
+                  </p:par>
+                  <p:par>
+                    <p:cTn id="7" fill="hold">
+                      <p:stCondLst>
+                        <p:cond delay="indefinite"/>
+                      </p:stCondLst>
+                      <p:childTnLst>
+                        <p:par>
+                          <p:cTn id="8" fill="hold">
+                            <p:stCondLst>
+                              <p:cond delay="0"/>
+                            </p:stCondLst>
+                            <p:childTnLst>
+                              <p:par>
+                                <p:cTn id="9" presetID="1" presetClass="entr" presetSubtype="0" fill="hold" grpId="0" nodeType="clickEffect">
+                                  <p:stCondLst>
+                                    <p:cond delay="0"/>
+                                  </p:stCondLst>
+                                  <p:childTnLst>
+                                    <p:set>
+                                      <p:cBhvr>
+                                        <p:cTn id="10" dur="1" fill="hold">
+                                          <p:stCondLst>
+                                            <p:cond delay="0"/>
+                                          </p:stCondLst>
+                                        </p:cTn>
+                                        <p:tgtEl>
+                                          <p:spTgt spid="95"/>
+                                        </p:tgtEl>
+                                        <p:attrNameLst>
+                                          <p:attrName>style.visibility</p:attrName>
+                                        </p:attrNameLst>
+                                      </p:cBhvr>
+                                      <p:to>
+                                        <p:strVal val="visible"/>
+                                      </p:to>
+                                    </p:set>
+                                  </p:childTnLst>
+                                </p:cTn>
+                              </p:par>
+                              <p:par>
+                                <p:cTn id="11" presetID="1" presetClass="entr" presetSubtype="0" fill="hold" nodeType="withEffect">
+                                  <p:stCondLst>
+                                    <p:cond delay="0"/>
+                                  </p:stCondLst>
+                                  <p:childTnLst>
+                                    <p:set>
+                                      <p:cBhvr>
+                                        <p:cTn id="12" dur="1" fill="hold">
+                                          <p:stCondLst>
+                                            <p:cond delay="0"/>
+                                          </p:stCondLst>
+                                        </p:cTn>
+                                        <p:tgtEl>
+                                          <p:spTgt spid="94"/>
+                                        </p:tgtEl>
+                                        <p:attrNameLst>
+                                          <p:attrName>style.visibility</p:attrName>
+                                        </p:attrNameLst>
+                                      </p:cBhvr>
+                                      <p:to>
+                                        <p:strVal val="visible"/>
+                                      </p:to>
+                                    </p:set>
+                                  </p:childTnLst>
+                                </p:cTn>
+                              </p:par>
+                              <p:par>
+                                <p:cTn id="13" presetID="1" presetClass="entr" presetSubtype="0" fill="hold" grpId="0" nodeType="withEffect">
+                                  <p:stCondLst>
+                                    <p:cond delay="0"/>
+                                  </p:stCondLst>
+                                  <p:childTnLst>
+                                    <p:set>
+                                      <p:cBhvr>
+                                        <p:cTn id="14" dur="1" fill="hold">
+                                          <p:stCondLst>
+                                            <p:cond delay="0"/>
+                                          </p:stCondLst>
+                                        </p:cTn>
+                                        <p:tgtEl>
+                                          <p:spTgt spid="96"/>
+                                        </p:tgtEl>
+                                        <p:attrNameLst>
+                                          <p:attrName>style.visibility</p:attrName>
+                                        </p:attrNameLst>
+                                      </p:cBhvr>
+                                      <p:to>
+                                        <p:strVal val="visible"/>
+                                      </p:to>
+                                    </p:set>
+                                  </p:childTnLst>
+                                </p:cTn>
+                              </p:par>
+                              <p:par>
+                                <p:cTn id="15" presetID="1" presetClass="entr" presetSubtype="0" fill="hold" nodeType="withEffect">
+                                  <p:stCondLst>
+                                    <p:cond delay="0"/>
+                                  </p:stCondLst>
+                                  <p:childTnLst>
+                                    <p:set>
+                                      <p:cBhvr>
+                                        <p:cTn id="16" dur="1" fill="hold">
+                                          <p:stCondLst>
+                                            <p:cond delay="0"/>
+                                          </p:stCondLst>
+                                        </p:cTn>
+                                        <p:tgtEl>
+                                          <p:spTgt spid="97"/>
+                                        </p:tgtEl>
+                                        <p:attrNameLst>
+                                          <p:attrName>style.visibility</p:attrName>
+                                        </p:attrNameLst>
+                                      </p:cBhvr>
+                                      <p:to>
+                                        <p:strVal val="visible"/>
+                                      </p:to>
+                                    </p:set>
+                                  </p:childTnLst>
+                                </p:cTn>
+                              </p:par>
+                              <p:par>
+                                <p:cTn id="17" presetID="1" presetClass="entr" presetSubtype="0" fill="hold" grpId="0" nodeType="withEffect">
+                                  <p:stCondLst>
+                                    <p:cond delay="0"/>
+                                  </p:stCondLst>
+                                  <p:childTnLst>
+                                    <p:set>
+                                      <p:cBhvr>
+                                        <p:cTn id="18" dur="1" fill="hold">
+                                          <p:stCondLst>
+                                            <p:cond delay="0"/>
+                                          </p:stCondLst>
+                                        </p:cTn>
+                                        <p:tgtEl>
+                                          <p:spTgt spid="98"/>
+                                        </p:tgtEl>
+                                        <p:attrNameLst>
+                                          <p:attrName>style.visibility</p:attrName>
+                                        </p:attrNameLst>
+                                      </p:cBhvr>
+                                      <p:to>
+                                        <p:strVal val="visible"/>
+                                      </p:to>
+                                    </p:set>
+                                  </p:childTnLst>
+                                </p:cTn>
+                              </p:par>
+                            </p:childTnLst>
+                          </p:cTn>
+                        </p:par>
+                      </p:childTnLst>
+                    </p:cTn>
+                  </p:par>
+                  <p:par>
+                    <p:cTn id="19" fill="hold">
+                      <p:stCondLst>
+                        <p:cond delay="indefinite"/>
+                      </p:stCondLst>
+                      <p:childTnLst>
+                        <p:par>
+                          <p:cTn id="20" fill="hold">
+                            <p:stCondLst>
+                              <p:cond delay="0"/>
+                            </p:stCondLst>
+                            <p:childTnLst>
+                              <p:par>
+                                <p:cTn id="21" presetID="1" presetClass="entr" presetSubtype="0" fill="hold" grpId="0" nodeType="clickEffect">
+                                  <p:stCondLst>
+                                    <p:cond delay="0"/>
+                                  </p:stCondLst>
+                                  <p:childTnLst>
+                                    <p:set>
+                                      <p:cBhvr>
+                                        <p:cTn id="22" dur="1" fill="hold">
+                                          <p:stCondLst>
+                                            <p:cond delay="0"/>
+                                          </p:stCondLst>
+                                        </p:cTn>
+                                        <p:tgtEl>
+                                          <p:spTgt spid="99"/>
+                                        </p:tgtEl>
+                                        <p:attrNameLst>
+                                          <p:attrName>style.visibility</p:attrName>
+                                        </p:attrNameLst>
+                                      </p:cBhvr>
+                                      <p:to>
+                                        <p:strVal val="visible"/>
+                                      </p:to>
+                                    </p:set>
+                                  </p:childTnLst>
+                                </p:cTn>
+                              </p:par>
+                            </p:childTnLst>
+                          </p:cTn>
+                        </p:par>
+                      </p:childTnLst>
+                    </p:cTn>
+                  </p:par>
+                  <p:par>
+                    <p:cTn id="23" fill="hold">
+                      <p:stCondLst>
+                        <p:cond delay="indefinite"/>
+                      </p:stCondLst>
+                      <p:childTnLst>
+                        <p:par>
+                          <p:cTn id="24" fill="hold">
+                            <p:stCondLst>
+                              <p:cond delay="0"/>
+                            </p:stCondLst>
+                            <p:childTnLst>
+                              <p:par>
+                                <p:cTn id="25" presetID="1" presetClass="entr" presetSubtype="0" fill="hold" nodeType="clickEffect">
+                                  <p:stCondLst>
+                                    <p:cond delay="0"/>
+                                  </p:stCondLst>
+                                  <p:childTnLst>
+                                    <p:set>
+                                      <p:cBhvr>
+                                        <p:cTn id="26" dur="1" fill="hold">
+                                          <p:stCondLst>
+                                            <p:cond delay="0"/>
+                                          </p:stCondLst>
+                                        </p:cTn>
+                                        <p:tgtEl>
+                                          <p:spTgt spid="100"/>
+                                        </p:tgtEl>
+                                        <p:attrNameLst>
+                                          <p:attrName>style.visibility</p:attrName>
+                                        </p:attrNameLst>
+                                      </p:cBhvr>
+                                      <p:to>
+                                        <p:strVal val="visible"/>
+                                      </p:to>
+                                    </p:set>
+                                  </p:childTnLst>
+                                </p:cTn>
+                              </p:par>
+                            </p:childTnLst>
+                          </p:cTn>
+                        </p:par>
+                      </p:childTnLst>
+                    </p:cTn>
+                  </p:par>
+                  <p:par>
+                    <p:cTn id="27" fill="hold">
+                      <p:stCondLst>
+                        <p:cond delay="indefinite"/>
+                      </p:stCondLst>
+                      <p:childTnLst>
+                        <p:par>
+                          <p:cTn id="28" fill="hold">
+                            <p:stCondLst>
+                              <p:cond delay="0"/>
+                            </p:stCondLst>
+                            <p:childTnLst>
+                              <p:par>
+                                <p:cTn id="29" presetID="1" presetClass="entr" presetSubtype="0" fill="hold" nodeType="clickEffect">
+                                  <p:stCondLst>
+                                    <p:cond delay="0"/>
+                                  </p:stCondLst>
+                                  <p:childTnLst>
+                                    <p:set>
+                                      <p:cBhvr>
+                                        <p:cTn id="30" dur="1" fill="hold">
+                                          <p:stCondLst>
+                                            <p:cond delay="0"/>
+                                          </p:stCondLst>
+                                        </p:cTn>
+                                        <p:tgtEl>
+                                          <p:spTgt spid="101"/>
+                                        </p:tgtEl>
+                                        <p:attrNameLst>
+                                          <p:attrName>style.visibility</p:attrName>
+                                        </p:attrNameLst>
+                                      </p:cBhvr>
+                                      <p:to>
+                                        <p:strVal val="visible"/>
+                                      </p:to>
+                                    </p:set>
+                                  </p:childTnLst>
+                                </p:cTn>
+                              </p:par>
+                            </p:childTnLst>
+                          </p:cTn>
+                        </p:par>
+                      </p:childTnLst>
+                    </p:cTn>
+                  </p:par>
+                  <p:par>
+                    <p:cTn id="31" fill="hold">
+                      <p:stCondLst>
+                        <p:cond delay="indefinite"/>
+                      </p:stCondLst>
+                      <p:childTnLst>
+                        <p:par>
+                          <p:cTn id="32" fill="hold">
+                            <p:stCondLst>
+                              <p:cond delay="0"/>
+                            </p:stCondLst>
+                            <p:childTnLst>
+                              <p:par>
+                                <p:cTn id="33" presetID="1" presetClass="entr" presetSubtype="0" fill="hold" nodeType="clickEffect">
+                                  <p:stCondLst>
+                                    <p:cond delay="0"/>
+                                  </p:stCondLst>
+                                  <p:childTnLst>
+                                    <p:set>
+                                      <p:cBhvr>
+                                        <p:cTn id="34" dur="1" fill="hold">
+                                          <p:stCondLst>
+                                            <p:cond delay="0"/>
+                                          </p:stCondLst>
+                                        </p:cTn>
+                                        <p:tgtEl>
+                                          <p:spTgt spid="102"/>
+                                        </p:tgtEl>
+                                        <p:attrNameLst>
+                                          <p:attrName>style.visibility</p:attrName>
+                                        </p:attrNameLst>
+                                      </p:cBhvr>
+                                      <p:to>
+                                        <p:strVal val="visible"/>
+                                      </p:to>
+                                    </p:set>
+                                  </p:childTnLst>
+                                </p:cTn>
+                              </p:par>
+                              <p:par>
+                                <p:cTn id="35" presetID="1" presetClass="entr" presetSubtype="0" fill="hold" nodeType="withEffect">
+                                  <p:stCondLst>
+                                    <p:cond delay="0"/>
+                                  </p:stCondLst>
+                                  <p:childTnLst>
+                                    <p:set>
+                                      <p:cBhvr>
+                                        <p:cTn id="36" dur="1" fill="hold">
+                                          <p:stCondLst>
+                                            <p:cond delay="0"/>
+                                          </p:stCondLst>
+                                        </p:cTn>
+                                        <p:tgtEl>
+                                          <p:spTgt spid="103"/>
+                                        </p:tgtEl>
+                                        <p:attrNameLst>
+                                          <p:attrName>style.visibility</p:attrName>
+                                        </p:attrNameLst>
+                                      </p:cBhvr>
+                                      <p:to>
+                                        <p:strVal val="visible"/>
+                                      </p:to>
+                                    </p:set>
+                                  </p:childTnLst>
+                                </p:cTn>
+                              </p:par>
+                            </p:childTnLst>
+                          </p:cTn>
+                        </p:par>
+                      </p:childTnLst>
+                    </p:cTn>
+                  </p:par>
+                  <p:par>
+                    <p:cTn id="37" fill="hold">
+                      <p:stCondLst>
+                        <p:cond delay="indefinite"/>
+                      </p:stCondLst>
+                      <p:childTnLst>
+                        <p:par>
+                          <p:cTn id="38" fill="hold">
+                            <p:stCondLst>
+                              <p:cond delay="0"/>
+                            </p:stCondLst>
+                            <p:childTnLst>
+                              <p:par>
+                                <p:cTn id="39" presetID="1" presetClass="entr" presetSubtype="0" fill="hold" nodeType="clickEffect">
+                                  <p:stCondLst>
+                                    <p:cond delay="0"/>
+                                  </p:stCondLst>
+                                  <p:childTnLst>
+                                    <p:set>
+                                      <p:cBhvr>
+                                        <p:cTn id="40" dur="1" fill="hold">
+                                          <p:stCondLst>
+                                            <p:cond delay="0"/>
+                                          </p:stCondLst>
+                                        </p:cTn>
+                                        <p:tgtEl>
+                                          <p:spTgt spid="107"/>
+                                        </p:tgtEl>
+                                        <p:attrNameLst>
+                                          <p:attrName>style.visibility</p:attrName>
+                                        </p:attrNameLst>
+                                      </p:cBhvr>
+                                      <p:to>
+                                        <p:strVal val="visible"/>
+                                      </p:to>
+                                    </p:set>
+                                  </p:childTnLst>
+                                </p:cTn>
+                              </p:par>
+                              <p:par>
+                                <p:cTn id="41" presetID="1" presetClass="entr" presetSubtype="0" fill="hold" grpId="0" nodeType="withEffect">
+                                  <p:stCondLst>
+                                    <p:cond delay="0"/>
+                                  </p:stCondLst>
+                                  <p:childTnLst>
+                                    <p:set>
+                                      <p:cBhvr>
+                                        <p:cTn id="42" dur="1" fill="hold">
+                                          <p:stCondLst>
+                                            <p:cond delay="0"/>
+                                          </p:stCondLst>
+                                        </p:cTn>
+                                        <p:tgtEl>
+                                          <p:spTgt spid="108"/>
+                                        </p:tgtEl>
+                                        <p:attrNameLst>
+                                          <p:attrName>style.visibility</p:attrName>
+                                        </p:attrNameLst>
+                                      </p:cBhvr>
+                                      <p:to>
+                                        <p:strVal val="visible"/>
+                                      </p:to>
+                                    </p:set>
+                                  </p:childTnLst>
+                                </p:cTn>
+                              </p:par>
+                            </p:childTnLst>
+                          </p:cTn>
+                        </p:par>
+                      </p:childTnLst>
+                    </p:cTn>
+                  </p:par>
+                  <p:par>
+                    <p:cTn id="43" fill="hold">
+                      <p:stCondLst>
+                        <p:cond delay="indefinite"/>
+                      </p:stCondLst>
+                      <p:childTnLst>
+                        <p:par>
+                          <p:cTn id="44" fill="hold">
+                            <p:stCondLst>
+                              <p:cond delay="0"/>
+                            </p:stCondLst>
+                            <p:childTnLst>
+                              <p:par>
+                                <p:cTn id="45" presetID="1" presetClass="entr" presetSubtype="0" fill="hold" nodeType="clickEffect">
+                                  <p:stCondLst>
+                                    <p:cond delay="0"/>
+                                  </p:stCondLst>
+                                  <p:childTnLst>
+                                    <p:set>
+                                      <p:cBhvr>
+                                        <p:cTn id="46" dur="1" fill="hold">
+                                          <p:stCondLst>
+                                            <p:cond delay="0"/>
+                                          </p:stCondLst>
+                                        </p:cTn>
+                                        <p:tgtEl>
+                                          <p:spTgt spid="113"/>
+                                        </p:tgtEl>
+                                        <p:attrNameLst>
+                                          <p:attrName>style.visibility</p:attrName>
+                                        </p:attrNameLst>
+                                      </p:cBhvr>
+                                      <p:to>
+                                        <p:strVal val="visible"/>
+                                      </p:to>
+                                    </p:set>
+                                  </p:childTnLst>
+                                </p:cTn>
+                              </p:par>
+                              <p:par>
+                                <p:cTn id="47" presetID="1" presetClass="entr" presetSubtype="0" fill="hold" nodeType="withEffect">
+                                  <p:stCondLst>
+                                    <p:cond delay="0"/>
+                                  </p:stCondLst>
+                                  <p:childTnLst>
+                                    <p:set>
+                                      <p:cBhvr>
+                                        <p:cTn id="48" dur="1" fill="hold">
+                                          <p:stCondLst>
+                                            <p:cond delay="0"/>
+                                          </p:stCondLst>
+                                        </p:cTn>
+                                        <p:tgtEl>
+                                          <p:spTgt spid="115"/>
+                                        </p:tgtEl>
+                                        <p:attrNameLst>
+                                          <p:attrName>style.visibility</p:attrName>
+                                        </p:attrNameLst>
+                                      </p:cBhvr>
+                                      <p:to>
+                                        <p:strVal val="visible"/>
+                                      </p:to>
+                                    </p:set>
+                                  </p:childTnLst>
+                                </p:cTn>
+                              </p:par>
+                              <p:par>
+                                <p:cTn id="49" presetID="1" presetClass="entr" presetSubtype="0" fill="hold" grpId="0" nodeType="withEffect">
+                                  <p:stCondLst>
+                                    <p:cond delay="0"/>
+                                  </p:stCondLst>
+                                  <p:childTnLst>
+                                    <p:set>
+                                      <p:cBhvr>
+                                        <p:cTn id="50" dur="1" fill="hold">
+                                          <p:stCondLst>
+                                            <p:cond delay="0"/>
+                                          </p:stCondLst>
+                                        </p:cTn>
+                                        <p:tgtEl>
+                                          <p:spTgt spid="116"/>
+                                        </p:tgtEl>
+                                        <p:attrNameLst>
+                                          <p:attrName>style.visibility</p:attrName>
+                                        </p:attrNameLst>
+                                      </p:cBhvr>
+                                      <p:to>
+                                        <p:strVal val="visible"/>
+                                      </p:to>
+                                    </p:set>
+                                  </p:childTnLst>
+                                </p:cTn>
+                              </p:par>
+                            </p:childTnLst>
+                          </p:cTn>
+                        </p:par>
+                      </p:childTnLst>
+                    </p:cTn>
+                  </p:par>
+                  <p:par>
+                    <p:cTn id="51" fill="hold">
+                      <p:stCondLst>
+                        <p:cond delay="indefinite"/>
+                      </p:stCondLst>
+                      <p:childTnLst>
+                        <p:par>
+                          <p:cTn id="52" fill="hold">
+                            <p:stCondLst>
+                              <p:cond delay="0"/>
+                            </p:stCondLst>
+                            <p:childTnLst>
+                              <p:par>
+                                <p:cTn id="53" presetID="1" presetClass="entr" presetSubtype="0" fill="hold" grpId="0" nodeType="clickEffect">
+                                  <p:stCondLst>
+                                    <p:cond delay="0"/>
+                                  </p:stCondLst>
+                                  <p:childTnLst>
+                                    <p:set>
+                                      <p:cBhvr>
+                                        <p:cTn id="54" dur="1" fill="hold">
+                                          <p:stCondLst>
+                                            <p:cond delay="0"/>
+                                          </p:stCondLst>
+                                        </p:cTn>
+                                        <p:tgtEl>
+                                          <p:spTgt spid="117"/>
+                                        </p:tgtEl>
+                                        <p:attrNameLst>
+                                          <p:attrName>style.visibility</p:attrName>
+                                        </p:attrNameLst>
+                                      </p:cBhvr>
+                                      <p:to>
+                                        <p:strVal val="visible"/>
+                                      </p:to>
+                                    </p:set>
+                                  </p:childTnLst>
+                                </p:cTn>
+                              </p:par>
+                            </p:childTnLst>
+                          </p:cTn>
+                        </p:par>
+                      </p:childTnLst>
+                    </p:cTn>
+                  </p:par>
+                  <p:par>
+                    <p:cTn id="55" fill="hold">
+                      <p:stCondLst>
+                        <p:cond delay="indefinite"/>
+                      </p:stCondLst>
+                      <p:childTnLst>
+                        <p:par>
+                          <p:cTn id="56" fill="hold">
+                            <p:stCondLst>
+                              <p:cond delay="0"/>
+                            </p:stCondLst>
+                            <p:childTnLst>
+                              <p:par>
+                                <p:cTn id="57" presetID="1" presetClass="entr" presetSubtype="0" fill="hold" nodeType="clickEffect">
+                                  <p:stCondLst>
+                                    <p:cond delay="0"/>
+                                  </p:stCondLst>
+                                  <p:childTnLst>
+                                    <p:set>
+                                      <p:cBhvr>
+                                        <p:cTn id="58" dur="1" fill="hold">
+                                          <p:stCondLst>
+                                            <p:cond delay="0"/>
+                                          </p:stCondLst>
+                                        </p:cTn>
+                                        <p:tgtEl>
+                                          <p:spTgt spid="118"/>
+                                        </p:tgtEl>
+                                        <p:attrNameLst>
+                                          <p:attrName>style.visibility</p:attrName>
+                                        </p:attrNameLst>
+                                      </p:cBhvr>
+                                      <p:to>
+                                        <p:strVal val="visible"/>
+                                      </p:to>
+                                    </p:set>
+                                  </p:childTnLst>
+                                </p:cTn>
+                              </p:par>
+                            </p:childTnLst>
+                          </p:cTn>
+                        </p:par>
+                      </p:childTnLst>
+                    </p:cTn>
+                  </p:par>
+                  <p:par>
+                    <p:cTn id="59" fill="hold">
+                      <p:stCondLst>
+                        <p:cond delay="indefinite"/>
+                      </p:stCondLst>
+                      <p:childTnLst>
+                        <p:par>
+                          <p:cTn id="60" fill="hold">
+                            <p:stCondLst>
+                              <p:cond delay="0"/>
+                            </p:stCondLst>
+                            <p:childTnLst>
+                              <p:par>
+                                <p:cTn id="61" presetID="1" presetClass="entr" presetSubtype="0" fill="hold" nodeType="clickEffect">
+                                  <p:stCondLst>
+                                    <p:cond delay="0"/>
+                                  </p:stCondLst>
+                                  <p:childTnLst>
+                                    <p:set>
+                                      <p:cBhvr>
+                                        <p:cTn id="62" dur="1" fill="hold">
+                                          <p:stCondLst>
+                                            <p:cond delay="0"/>
+                                          </p:stCondLst>
+                                        </p:cTn>
+                                        <p:tgtEl>
+                                          <p:spTgt spid="120"/>
+                                        </p:tgtEl>
+                                        <p:attrNameLst>
+                                          <p:attrName>style.visibility</p:attrName>
+                                        </p:attrNameLst>
+                                      </p:cBhvr>
+                                      <p:to>
+                                        <p:strVal val="visible"/>
+                                      </p:to>
+                                    </p:set>
+                                  </p:childTnLst>
+                                </p:cTn>
+                              </p:par>
+                              <p:par>
+                                <p:cTn id="63" presetID="1" presetClass="entr" presetSubtype="0" fill="hold" grpId="0" nodeType="withEffect">
+                                  <p:stCondLst>
+                                    <p:cond delay="0"/>
+                                  </p:stCondLst>
+                                  <p:childTnLst>
+                                    <p:set>
+                                      <p:cBhvr>
+                                        <p:cTn id="64" dur="1" fill="hold">
+                                          <p:stCondLst>
+                                            <p:cond delay="0"/>
+                                          </p:stCondLst>
+                                        </p:cTn>
+                                        <p:tgtEl>
+                                          <p:spTgt spid="121"/>
+                                        </p:tgtEl>
+                                        <p:attrNameLst>
+                                          <p:attrName>style.visibility</p:attrName>
+                                        </p:attrNameLst>
+                                      </p:cBhvr>
+                                      <p:to>
+                                        <p:strVal val="visible"/>
+                                      </p:to>
+                                    </p:set>
+                                  </p:childTnLst>
+                                </p:cTn>
+                              </p:par>
+                            </p:childTnLst>
+                          </p:cTn>
+                        </p:par>
+                      </p:childTnLst>
+                    </p:cTn>
+                  </p:par>
+                  <p:par>
+                    <p:cTn id="65" fill="hold">
+                      <p:stCondLst>
+                        <p:cond delay="indefinite"/>
+                      </p:stCondLst>
+                      <p:childTnLst>
+                        <p:par>
+                          <p:cTn id="66" fill="hold">
+                            <p:stCondLst>
+                              <p:cond delay="0"/>
+                            </p:stCondLst>
+                            <p:childTnLst>
+                              <p:par>
+                                <p:cTn id="67" presetID="1" presetClass="entr" presetSubtype="0" fill="hold" nodeType="clickEffect">
+                                  <p:stCondLst>
+                                    <p:cond delay="0"/>
+                                  </p:stCondLst>
+                                  <p:childTnLst>
+                                    <p:set>
+                                      <p:cBhvr>
+                                        <p:cTn id="68" dur="1" fill="hold">
+                                          <p:stCondLst>
+                                            <p:cond delay="0"/>
+                                          </p:stCondLst>
+                                        </p:cTn>
+                                        <p:tgtEl>
+                                          <p:spTgt spid="122"/>
+                                        </p:tgtEl>
+                                        <p:attrNameLst>
+                                          <p:attrName>style.visibility</p:attrName>
+                                        </p:attrNameLst>
+                                      </p:cBhvr>
+                                      <p:to>
+                                        <p:strVal val="visible"/>
+                                      </p:to>
+                                    </p:set>
+                                  </p:childTnLst>
+                                </p:cTn>
+                              </p:par>
+                              <p:par>
+                                <p:cTn id="69" presetID="1" presetClass="entr" presetSubtype="0" fill="hold" grpId="0" nodeType="withEffect">
+                                  <p:stCondLst>
+                                    <p:cond delay="0"/>
+                                  </p:stCondLst>
+                                  <p:childTnLst>
+                                    <p:set>
+                                      <p:cBhvr>
+                                        <p:cTn id="70" dur="1" fill="hold">
+                                          <p:stCondLst>
+                                            <p:cond delay="0"/>
+                                          </p:stCondLst>
+                                        </p:cTn>
+                                        <p:tgtEl>
+                                          <p:spTgt spid="123"/>
+                                        </p:tgtEl>
+                                        <p:attrNameLst>
+                                          <p:attrName>style.visibility</p:attrName>
+                                        </p:attrNameLst>
+                                      </p:cBhvr>
+                                      <p:to>
+                                        <p:strVal val="visible"/>
+                                      </p:to>
+                                    </p:set>
+                                  </p:childTnLst>
+                                </p:cTn>
+                              </p:par>
+                              <p:par>
+                                <p:cTn id="71" presetID="1" presetClass="entr" presetSubtype="0" fill="hold" nodeType="withEffect">
+                                  <p:stCondLst>
+                                    <p:cond delay="0"/>
+                                  </p:stCondLst>
+                                  <p:childTnLst>
+                                    <p:set>
+                                      <p:cBhvr>
+                                        <p:cTn id="72" dur="1" fill="hold">
+                                          <p:stCondLst>
+                                            <p:cond delay="0"/>
+                                          </p:stCondLst>
+                                        </p:cTn>
+                                        <p:tgtEl>
+                                          <p:spTgt spid="124"/>
+                                        </p:tgtEl>
+                                        <p:attrNameLst>
+                                          <p:attrName>style.visibility</p:attrName>
+                                        </p:attrNameLst>
+                                      </p:cBhvr>
+                                      <p:to>
+                                        <p:strVal val="visible"/>
+                                      </p:to>
+                                    </p:set>
+                                  </p:childTnLst>
+                                </p:cTn>
+                              </p:par>
+                            </p:childTnLst>
+                          </p:cTn>
+                        </p:par>
+                      </p:childTnLst>
+                    </p:cTn>
+                  </p:par>
+                  <p:par>
+                    <p:cTn id="73" fill="hold">
+                      <p:stCondLst>
+                        <p:cond delay="indefinite"/>
+                      </p:stCondLst>
+                      <p:childTnLst>
+                        <p:par>
+                          <p:cTn id="74" fill="hold">
+                            <p:stCondLst>
+                              <p:cond delay="0"/>
+                            </p:stCondLst>
+                            <p:childTnLst>
+                              <p:par>
+                                <p:cTn id="75" presetID="1" presetClass="entr" presetSubtype="0" fill="hold" nodeType="clickEffect">
+                                  <p:stCondLst>
+                                    <p:cond delay="0"/>
+                                  </p:stCondLst>
+                                  <p:childTnLst>
+                                    <p:set>
+                                      <p:cBhvr>
+                                        <p:cTn id="76" dur="1" fill="hold">
+                                          <p:stCondLst>
+                                            <p:cond delay="0"/>
+                                          </p:stCondLst>
+                                        </p:cTn>
+                                        <p:tgtEl>
+                                          <p:spTgt spid="126"/>
+                                        </p:tgtEl>
+                                        <p:attrNameLst>
+                                          <p:attrName>style.visibility</p:attrName>
+                                        </p:attrNameLst>
+                                      </p:cBhvr>
+                                      <p:to>
+                                        <p:strVal val="visible"/>
+                                      </p:to>
+                                    </p:set>
+                                  </p:childTnLst>
+                                </p:cTn>
+                              </p:par>
+                            </p:childTnLst>
+                          </p:cTn>
+                        </p:par>
+                      </p:childTnLst>
+                    </p:cTn>
+                  </p:par>
+                  <p:par>
+                    <p:cTn id="77" fill="hold">
+                      <p:stCondLst>
+                        <p:cond delay="indefinite"/>
+                      </p:stCondLst>
+                      <p:childTnLst>
+                        <p:par>
+                          <p:cTn id="78" fill="hold">
+                            <p:stCondLst>
+                              <p:cond delay="0"/>
+                            </p:stCondLst>
+                            <p:childTnLst>
+                              <p:par>
+                                <p:cTn id="79" presetID="1" presetClass="entr" presetSubtype="0" fill="hold" nodeType="clickEffect">
+                                  <p:stCondLst>
+                                    <p:cond delay="0"/>
+                                  </p:stCondLst>
+                                  <p:childTnLst>
+                                    <p:set>
+                                      <p:cBhvr>
+                                        <p:cTn id="80" dur="1" fill="hold">
+                                          <p:stCondLst>
+                                            <p:cond delay="0"/>
+                                          </p:stCondLst>
+                                        </p:cTn>
+                                        <p:tgtEl>
+                                          <p:spTgt spid="128"/>
+                                        </p:tgtEl>
+                                        <p:attrNameLst>
+                                          <p:attrName>style.visibility</p:attrName>
+                                        </p:attrNameLst>
+                                      </p:cBhvr>
+                                      <p:to>
+                                        <p:strVal val="visible"/>
+                                      </p:to>
+                                    </p:set>
+                                  </p:childTnLst>
+                                </p:cTn>
+                              </p:par>
+                              <p:par>
+                                <p:cTn id="81" presetID="1" presetClass="entr" presetSubtype="0" fill="hold" grpId="0" nodeType="withEffect">
+                                  <p:stCondLst>
+                                    <p:cond delay="0"/>
+                                  </p:stCondLst>
+                                  <p:childTnLst>
+                                    <p:set>
+                                      <p:cBhvr>
+                                        <p:cTn id="82" dur="1" fill="hold">
+                                          <p:stCondLst>
+                                            <p:cond delay="0"/>
+                                          </p:stCondLst>
+                                        </p:cTn>
+                                        <p:tgtEl>
+                                          <p:spTgt spid="129"/>
+                                        </p:tgtEl>
+                                        <p:attrNameLst>
+                                          <p:attrName>style.visibility</p:attrName>
+                                        </p:attrNameLst>
+                                      </p:cBhvr>
+                                      <p:to>
+                                        <p:strVal val="visible"/>
+                                      </p:to>
+                                    </p:set>
+                                  </p:childTnLst>
+                                </p:cTn>
+                              </p:par>
+                            </p:childTnLst>
+                          </p:cTn>
+                        </p:par>
+                      </p:childTnLst>
+                    </p:cTn>
+                  </p:par>
+                  <p:par>
+                    <p:cTn id="83" fill="hold">
+                      <p:stCondLst>
+                        <p:cond delay="indefinite"/>
+                      </p:stCondLst>
+                      <p:childTnLst>
+                        <p:par>
+                          <p:cTn id="84" fill="hold">
+                            <p:stCondLst>
+                              <p:cond delay="0"/>
+                            </p:stCondLst>
+                            <p:childTnLst>
+                              <p:par>
+                                <p:cTn id="85" presetID="1" presetClass="entr" presetSubtype="0" fill="hold" nodeType="clickEffect">
+                                  <p:stCondLst>
+                                    <p:cond delay="0"/>
+                                  </p:stCondLst>
+                                  <p:childTnLst>
+                                    <p:set>
+                                      <p:cBhvr>
+                                        <p:cTn id="86" dur="1" fill="hold">
+                                          <p:stCondLst>
+                                            <p:cond delay="0"/>
+                                          </p:stCondLst>
+                                        </p:cTn>
+                                        <p:tgtEl>
+                                          <p:spTgt spid="130"/>
+                                        </p:tgtEl>
+                                        <p:attrNameLst>
+                                          <p:attrName>style.visibility</p:attrName>
+                                        </p:attrNameLst>
+                                      </p:cBhvr>
+                                      <p:to>
+                                        <p:strVal val="visible"/>
+                                      </p:to>
+                                    </p:set>
+                                  </p:childTnLst>
+                                </p:cTn>
+                              </p:par>
+                            </p:childTnLst>
+                          </p:cTn>
+                        </p:par>
+                      </p:childTnLst>
+                    </p:cTn>
+                  </p:par>
+                </p:childTnLst>
+              </p:cTn>
+              <p:prevCondLst>
+                <p:cond evt="onPrev" delay="0">
+                  <p:tgtEl>
+                    <p:sldTgt/>
+                  </p:tgtEl>
+                </p:cond>
+              </p:prevCondLst>
+              <p:nextCondLst>
+                <p:cond evt="onNext" delay="0">
+                  <p:tgtEl>
+                    <p:sldTgt/>
+                  </p:tgtEl>
+                </p:cond>
+              </p:nextCondLst>
+            </p:seq>
+          </p:childTnLst>
+        </p:cTn>
+      </p:par>
+    </p:tnLst>
+    <p:bldLst>
+      <p:bldP spid="95" grpId="0"/>
+      <p:bldP spid="96" grpId="0"/>
+      <p:bldP spid="98" grpId="0"/>
+      <p:bldP spid="99" grpId="0"/>
+      <p:bldP spid="108" grpId="0"/>
+      <p:bldP spid="116" grpId="0"/>
+      <p:bldP spid="117" grpId="0"/>
+      <p:bldP spid="121" grpId="0"/>
+      <p:bldP spid="123" grpId="0"/>
+      <p:bldP spid="129" grpId="0"/>
+    </p:bldLst>
+  </p:timing>
 </p:sld>
 </file>
 

</xml_diff>